<commit_message>
fix errors in the figure image
</commit_message>
<xml_diff>
--- a/Manuscript/chemical_graph.pptx
+++ b/Manuscript/chemical_graph.pptx
@@ -6114,8 +6114,8 @@
             </p:nvCxnSpPr>
             <p:spPr>
               <a:xfrm>
-                <a:off x="3208335" y="1835532"/>
-                <a:ext cx="0" cy="700062"/>
+                <a:off x="3208335" y="2257571"/>
+                <a:ext cx="0" cy="278023"/>
               </a:xfrm>
               <a:prstGeom prst="line">
                 <a:avLst/>
@@ -6149,7 +6149,7 @@
             </p:nvSpPr>
             <p:spPr>
               <a:xfrm>
-                <a:off x="2998983" y="1340768"/>
+                <a:off x="3019270" y="1858276"/>
                 <a:ext cx="418704" cy="369332"/>
               </a:xfrm>
               <a:prstGeom prst="rect">
@@ -6240,8 +6240,8 @@
           </p:nvCxnSpPr>
           <p:spPr>
             <a:xfrm>
-              <a:off x="5420510" y="4437112"/>
-              <a:ext cx="0" cy="1780182"/>
+              <a:off x="5420510" y="4580768"/>
+              <a:ext cx="0" cy="1636526"/>
             </a:xfrm>
             <a:prstGeom prst="line">
               <a:avLst/>
@@ -6270,13 +6270,15 @@
         <p:cxnSp>
           <p:nvCxnSpPr>
             <p:cNvPr id="51" name="直接连接符 50"/>
-            <p:cNvCxnSpPr/>
+            <p:cNvCxnSpPr>
+              <a:stCxn id="61" idx="2"/>
+            </p:cNvCxnSpPr>
             <p:nvPr/>
           </p:nvCxnSpPr>
           <p:spPr>
             <a:xfrm>
-              <a:off x="6038469" y="4390125"/>
-              <a:ext cx="0" cy="1780182"/>
+              <a:off x="6038469" y="4080225"/>
+              <a:ext cx="0" cy="2090082"/>
             </a:xfrm>
             <a:prstGeom prst="line">
               <a:avLst/>
@@ -6440,7 +6442,7 @@
           </p:nvSpPr>
           <p:spPr>
             <a:xfrm>
-              <a:off x="5829117" y="4014356"/>
+              <a:off x="5829117" y="3710893"/>
               <a:ext cx="418704" cy="369332"/>
             </a:xfrm>
             <a:prstGeom prst="rect">
@@ -6474,7 +6476,7 @@
           </p:nvSpPr>
           <p:spPr>
             <a:xfrm>
-              <a:off x="5235761" y="4080225"/>
+              <a:off x="5235761" y="4211436"/>
               <a:ext cx="301686" cy="369332"/>
             </a:xfrm>
             <a:prstGeom prst="rect">

</xml_diff>

<commit_message>
add energy distribution curve example
</commit_message>
<xml_diff>
--- a/Manuscript/chemical_graph.pptx
+++ b/Manuscript/chemical_graph.pptx
@@ -8,6 +8,7 @@
     <p:sldId id="256" r:id="rId2"/>
     <p:sldId id="257" r:id="rId3"/>
     <p:sldId id="258" r:id="rId4"/>
+    <p:sldId id="259" r:id="rId5"/>
   </p:sldIdLst>
   <p:sldSz cx="9144000" cy="6858000" type="screen4x3"/>
   <p:notesSz cx="6858000" cy="9144000"/>
@@ -290,7 +291,7 @@
           <a:p>
             <a:fld id="{530820CF-B880-4189-942D-D702A7CBA730}" type="datetimeFigureOut">
               <a:rPr lang="zh-CN" altLang="en-US" smtClean="0"/>
-              <a:t>2017/10/27</a:t>
+              <a:t>2017/10/28</a:t>
             </a:fld>
             <a:endParaRPr lang="zh-CN" altLang="en-US"/>
           </a:p>
@@ -455,7 +456,7 @@
           <a:p>
             <a:fld id="{530820CF-B880-4189-942D-D702A7CBA730}" type="datetimeFigureOut">
               <a:rPr lang="zh-CN" altLang="en-US" smtClean="0"/>
-              <a:t>2017/10/27</a:t>
+              <a:t>2017/10/28</a:t>
             </a:fld>
             <a:endParaRPr lang="zh-CN" altLang="en-US"/>
           </a:p>
@@ -630,7 +631,7 @@
           <a:p>
             <a:fld id="{530820CF-B880-4189-942D-D702A7CBA730}" type="datetimeFigureOut">
               <a:rPr lang="zh-CN" altLang="en-US" smtClean="0"/>
-              <a:t>2017/10/27</a:t>
+              <a:t>2017/10/28</a:t>
             </a:fld>
             <a:endParaRPr lang="zh-CN" altLang="en-US"/>
           </a:p>
@@ -795,7 +796,7 @@
           <a:p>
             <a:fld id="{530820CF-B880-4189-942D-D702A7CBA730}" type="datetimeFigureOut">
               <a:rPr lang="zh-CN" altLang="en-US" smtClean="0"/>
-              <a:t>2017/10/27</a:t>
+              <a:t>2017/10/28</a:t>
             </a:fld>
             <a:endParaRPr lang="zh-CN" altLang="en-US"/>
           </a:p>
@@ -1036,7 +1037,7 @@
           <a:p>
             <a:fld id="{530820CF-B880-4189-942D-D702A7CBA730}" type="datetimeFigureOut">
               <a:rPr lang="zh-CN" altLang="en-US" smtClean="0"/>
-              <a:t>2017/10/27</a:t>
+              <a:t>2017/10/28</a:t>
             </a:fld>
             <a:endParaRPr lang="zh-CN" altLang="en-US"/>
           </a:p>
@@ -1319,7 +1320,7 @@
           <a:p>
             <a:fld id="{530820CF-B880-4189-942D-D702A7CBA730}" type="datetimeFigureOut">
               <a:rPr lang="zh-CN" altLang="en-US" smtClean="0"/>
-              <a:t>2017/10/27</a:t>
+              <a:t>2017/10/28</a:t>
             </a:fld>
             <a:endParaRPr lang="zh-CN" altLang="en-US"/>
           </a:p>
@@ -1736,7 +1737,7 @@
           <a:p>
             <a:fld id="{530820CF-B880-4189-942D-D702A7CBA730}" type="datetimeFigureOut">
               <a:rPr lang="zh-CN" altLang="en-US" smtClean="0"/>
-              <a:t>2017/10/27</a:t>
+              <a:t>2017/10/28</a:t>
             </a:fld>
             <a:endParaRPr lang="zh-CN" altLang="en-US"/>
           </a:p>
@@ -1849,7 +1850,7 @@
           <a:p>
             <a:fld id="{530820CF-B880-4189-942D-D702A7CBA730}" type="datetimeFigureOut">
               <a:rPr lang="zh-CN" altLang="en-US" smtClean="0"/>
-              <a:t>2017/10/27</a:t>
+              <a:t>2017/10/28</a:t>
             </a:fld>
             <a:endParaRPr lang="zh-CN" altLang="en-US"/>
           </a:p>
@@ -1939,7 +1940,7 @@
           <a:p>
             <a:fld id="{530820CF-B880-4189-942D-D702A7CBA730}" type="datetimeFigureOut">
               <a:rPr lang="zh-CN" altLang="en-US" smtClean="0"/>
-              <a:t>2017/10/27</a:t>
+              <a:t>2017/10/28</a:t>
             </a:fld>
             <a:endParaRPr lang="zh-CN" altLang="en-US"/>
           </a:p>
@@ -2211,7 +2212,7 @@
           <a:p>
             <a:fld id="{530820CF-B880-4189-942D-D702A7CBA730}" type="datetimeFigureOut">
               <a:rPr lang="zh-CN" altLang="en-US" smtClean="0"/>
-              <a:t>2017/10/27</a:t>
+              <a:t>2017/10/28</a:t>
             </a:fld>
             <a:endParaRPr lang="zh-CN" altLang="en-US"/>
           </a:p>
@@ -2459,7 +2460,7 @@
           <a:p>
             <a:fld id="{530820CF-B880-4189-942D-D702A7CBA730}" type="datetimeFigureOut">
               <a:rPr lang="zh-CN" altLang="en-US" smtClean="0"/>
-              <a:t>2017/10/27</a:t>
+              <a:t>2017/10/28</a:t>
             </a:fld>
             <a:endParaRPr lang="zh-CN" altLang="en-US"/>
           </a:p>
@@ -2667,7 +2668,7 @@
           <a:p>
             <a:fld id="{530820CF-B880-4189-942D-D702A7CBA730}" type="datetimeFigureOut">
               <a:rPr lang="zh-CN" altLang="en-US" smtClean="0"/>
-              <a:t>2017/10/27</a:t>
+              <a:t>2017/10/28</a:t>
             </a:fld>
             <a:endParaRPr lang="zh-CN" altLang="en-US"/>
           </a:p>
@@ -3367,6 +3368,13 @@
   <p:clrMapOvr>
     <a:masterClrMapping/>
   </p:clrMapOvr>
+  <p:timing>
+    <p:tnLst>
+      <p:par>
+        <p:cTn id="1" dur="indefinite" restart="never" nodeType="tmRoot"/>
+      </p:par>
+    </p:tnLst>
+  </p:timing>
 </p:sld>
 </file>
 
@@ -5205,6 +5213,13 @@
   <p:clrMapOvr>
     <a:masterClrMapping/>
   </p:clrMapOvr>
+  <p:timing>
+    <p:tnLst>
+      <p:par>
+        <p:cTn id="1" dur="indefinite" restart="never" nodeType="tmRoot"/>
+      </p:par>
+    </p:tnLst>
+  </p:timing>
 </p:sld>
 </file>
 
@@ -6509,6 +6524,851 @@
   <p:clrMapOvr>
     <a:masterClrMapping/>
   </p:clrMapOvr>
+  <p:timing>
+    <p:tnLst>
+      <p:par>
+        <p:cTn id="1" dur="indefinite" restart="never" nodeType="tmRoot"/>
+      </p:par>
+    </p:tnLst>
+  </p:timing>
+</p:sld>
+</file>
+
+<file path=ppt/slides/slide4.xml><?xml version="1.0" encoding="utf-8"?>
+<p:sld xmlns:a="http://schemas.openxmlformats.org/drawingml/2006/main" xmlns:r="http://schemas.openxmlformats.org/officeDocument/2006/relationships" xmlns:p="http://schemas.openxmlformats.org/presentationml/2006/main">
+  <p:cSld>
+    <p:spTree>
+      <p:nvGrpSpPr>
+        <p:cNvPr id="1" name=""/>
+        <p:cNvGrpSpPr/>
+        <p:nvPr/>
+      </p:nvGrpSpPr>
+      <p:grpSpPr>
+        <a:xfrm>
+          <a:off x="0" y="0"/>
+          <a:ext cx="0" cy="0"/>
+          <a:chOff x="0" y="0"/>
+          <a:chExt cx="0" cy="0"/>
+        </a:xfrm>
+      </p:grpSpPr>
+      <p:grpSp>
+        <p:nvGrpSpPr>
+          <p:cNvPr id="46" name="组合 45"/>
+          <p:cNvGrpSpPr/>
+          <p:nvPr/>
+        </p:nvGrpSpPr>
+        <p:grpSpPr>
+          <a:xfrm>
+            <a:off x="363278" y="1268760"/>
+            <a:ext cx="8580294" cy="5209547"/>
+            <a:chOff x="363278" y="1268760"/>
+            <a:chExt cx="8580294" cy="5209547"/>
+          </a:xfrm>
+        </p:grpSpPr>
+        <p:cxnSp>
+          <p:nvCxnSpPr>
+            <p:cNvPr id="5" name="直接箭头连接符 4"/>
+            <p:cNvCxnSpPr/>
+            <p:nvPr/>
+          </p:nvCxnSpPr>
+          <p:spPr>
+            <a:xfrm>
+              <a:off x="489862" y="6077617"/>
+              <a:ext cx="8418264" cy="0"/>
+            </a:xfrm>
+            <a:prstGeom prst="straightConnector1">
+              <a:avLst/>
+            </a:prstGeom>
+            <a:ln w="63500">
+              <a:solidFill>
+                <a:schemeClr val="tx1"/>
+              </a:solidFill>
+              <a:tailEnd type="triangle"/>
+            </a:ln>
+          </p:spPr>
+          <p:style>
+            <a:lnRef idx="1">
+              <a:schemeClr val="accent1"/>
+            </a:lnRef>
+            <a:fillRef idx="0">
+              <a:schemeClr val="accent1"/>
+            </a:fillRef>
+            <a:effectRef idx="0">
+              <a:schemeClr val="accent1"/>
+            </a:effectRef>
+            <a:fontRef idx="minor">
+              <a:schemeClr val="tx1"/>
+            </a:fontRef>
+          </p:style>
+        </p:cxnSp>
+        <p:cxnSp>
+          <p:nvCxnSpPr>
+            <p:cNvPr id="6" name="直接箭头连接符 5"/>
+            <p:cNvCxnSpPr/>
+            <p:nvPr/>
+          </p:nvCxnSpPr>
+          <p:spPr>
+            <a:xfrm flipV="1">
+              <a:off x="489862" y="1268760"/>
+              <a:ext cx="0" cy="4808857"/>
+            </a:xfrm>
+            <a:prstGeom prst="straightConnector1">
+              <a:avLst/>
+            </a:prstGeom>
+            <a:ln w="63500">
+              <a:solidFill>
+                <a:schemeClr val="tx1"/>
+              </a:solidFill>
+              <a:tailEnd type="triangle"/>
+            </a:ln>
+          </p:spPr>
+          <p:style>
+            <a:lnRef idx="1">
+              <a:schemeClr val="accent1"/>
+            </a:lnRef>
+            <a:fillRef idx="0">
+              <a:schemeClr val="accent1"/>
+            </a:fillRef>
+            <a:effectRef idx="0">
+              <a:schemeClr val="accent1"/>
+            </a:effectRef>
+            <a:fontRef idx="minor">
+              <a:schemeClr val="tx1"/>
+            </a:fontRef>
+          </p:style>
+        </p:cxnSp>
+        <p:sp>
+          <p:nvSpPr>
+            <p:cNvPr id="9" name="TextBox 8"/>
+            <p:cNvSpPr txBox="1"/>
+            <p:nvPr/>
+          </p:nvSpPr>
+          <p:spPr>
+            <a:xfrm>
+              <a:off x="8116038" y="6108975"/>
+              <a:ext cx="827534" cy="369332"/>
+            </a:xfrm>
+            <a:prstGeom prst="rect">
+              <a:avLst/>
+            </a:prstGeom>
+            <a:noFill/>
+          </p:spPr>
+          <p:txBody>
+            <a:bodyPr wrap="none" rtlCol="0">
+              <a:spAutoFit/>
+            </a:bodyPr>
+            <a:lstStyle/>
+            <a:p>
+              <a:r>
+                <a:rPr lang="en-US" altLang="zh-CN" dirty="0" smtClean="0"/>
+                <a:t>energy</a:t>
+              </a:r>
+              <a:endParaRPr lang="zh-CN" altLang="en-US" dirty="0"/>
+            </a:p>
+          </p:txBody>
+        </p:sp>
+        <p:sp>
+          <p:nvSpPr>
+            <p:cNvPr id="10" name="TextBox 9"/>
+            <p:cNvSpPr txBox="1"/>
+            <p:nvPr/>
+          </p:nvSpPr>
+          <p:spPr>
+            <a:xfrm>
+              <a:off x="561870" y="1484784"/>
+              <a:ext cx="969624" cy="369332"/>
+            </a:xfrm>
+            <a:prstGeom prst="rect">
+              <a:avLst/>
+            </a:prstGeom>
+            <a:noFill/>
+          </p:spPr>
+          <p:txBody>
+            <a:bodyPr wrap="none" rtlCol="0">
+              <a:spAutoFit/>
+            </a:bodyPr>
+            <a:lstStyle/>
+            <a:p>
+              <a:r>
+                <a:rPr lang="en-US" altLang="zh-CN" dirty="0" smtClean="0"/>
+                <a:t>quantity</a:t>
+              </a:r>
+              <a:endParaRPr lang="zh-CN" altLang="en-US" dirty="0"/>
+            </a:p>
+          </p:txBody>
+        </p:sp>
+        <p:sp>
+          <p:nvSpPr>
+            <p:cNvPr id="13" name="椭圆 12"/>
+            <p:cNvSpPr/>
+            <p:nvPr/>
+          </p:nvSpPr>
+          <p:spPr>
+            <a:xfrm>
+              <a:off x="363278" y="5946294"/>
+              <a:ext cx="198592" cy="219010"/>
+            </a:xfrm>
+            <a:prstGeom prst="ellipse">
+              <a:avLst/>
+            </a:prstGeom>
+          </p:spPr>
+          <p:style>
+            <a:lnRef idx="1">
+              <a:schemeClr val="accent2"/>
+            </a:lnRef>
+            <a:fillRef idx="3">
+              <a:schemeClr val="accent2"/>
+            </a:fillRef>
+            <a:effectRef idx="2">
+              <a:schemeClr val="accent2"/>
+            </a:effectRef>
+            <a:fontRef idx="minor">
+              <a:schemeClr val="lt1"/>
+            </a:fontRef>
+          </p:style>
+          <p:txBody>
+            <a:bodyPr rtlCol="0" anchor="ctr"/>
+            <a:lstStyle/>
+            <a:p>
+              <a:pPr algn="ctr"/>
+              <a:endParaRPr lang="zh-CN" altLang="en-US"/>
+            </a:p>
+          </p:txBody>
+        </p:sp>
+        <p:sp>
+          <p:nvSpPr>
+            <p:cNvPr id="14" name="椭圆 13"/>
+            <p:cNvSpPr/>
+            <p:nvPr/>
+          </p:nvSpPr>
+          <p:spPr>
+            <a:xfrm>
+              <a:off x="2195736" y="5774292"/>
+              <a:ext cx="198592" cy="219010"/>
+            </a:xfrm>
+            <a:prstGeom prst="ellipse">
+              <a:avLst/>
+            </a:prstGeom>
+          </p:spPr>
+          <p:style>
+            <a:lnRef idx="1">
+              <a:schemeClr val="accent2"/>
+            </a:lnRef>
+            <a:fillRef idx="3">
+              <a:schemeClr val="accent2"/>
+            </a:fillRef>
+            <a:effectRef idx="2">
+              <a:schemeClr val="accent2"/>
+            </a:effectRef>
+            <a:fontRef idx="minor">
+              <a:schemeClr val="lt1"/>
+            </a:fontRef>
+          </p:style>
+          <p:txBody>
+            <a:bodyPr rtlCol="0" anchor="ctr"/>
+            <a:lstStyle/>
+            <a:p>
+              <a:pPr algn="ctr"/>
+              <a:endParaRPr lang="zh-CN" altLang="en-US"/>
+            </a:p>
+          </p:txBody>
+        </p:sp>
+        <p:sp>
+          <p:nvSpPr>
+            <p:cNvPr id="15" name="椭圆 14"/>
+            <p:cNvSpPr/>
+            <p:nvPr/>
+          </p:nvSpPr>
+          <p:spPr>
+            <a:xfrm>
+              <a:off x="3203848" y="5208865"/>
+              <a:ext cx="198592" cy="219010"/>
+            </a:xfrm>
+            <a:prstGeom prst="ellipse">
+              <a:avLst/>
+            </a:prstGeom>
+          </p:spPr>
+          <p:style>
+            <a:lnRef idx="1">
+              <a:schemeClr val="accent2"/>
+            </a:lnRef>
+            <a:fillRef idx="3">
+              <a:schemeClr val="accent2"/>
+            </a:fillRef>
+            <a:effectRef idx="2">
+              <a:schemeClr val="accent2"/>
+            </a:effectRef>
+            <a:fontRef idx="minor">
+              <a:schemeClr val="lt1"/>
+            </a:fontRef>
+          </p:style>
+          <p:txBody>
+            <a:bodyPr rtlCol="0" anchor="ctr"/>
+            <a:lstStyle/>
+            <a:p>
+              <a:pPr algn="ctr"/>
+              <a:endParaRPr lang="zh-CN" altLang="en-US"/>
+            </a:p>
+          </p:txBody>
+        </p:sp>
+        <p:sp>
+          <p:nvSpPr>
+            <p:cNvPr id="16" name="椭圆 15"/>
+            <p:cNvSpPr/>
+            <p:nvPr/>
+          </p:nvSpPr>
+          <p:spPr>
+            <a:xfrm>
+              <a:off x="3851920" y="2924944"/>
+              <a:ext cx="198592" cy="219010"/>
+            </a:xfrm>
+            <a:prstGeom prst="ellipse">
+              <a:avLst/>
+            </a:prstGeom>
+          </p:spPr>
+          <p:style>
+            <a:lnRef idx="1">
+              <a:schemeClr val="accent2"/>
+            </a:lnRef>
+            <a:fillRef idx="3">
+              <a:schemeClr val="accent2"/>
+            </a:fillRef>
+            <a:effectRef idx="2">
+              <a:schemeClr val="accent2"/>
+            </a:effectRef>
+            <a:fontRef idx="minor">
+              <a:schemeClr val="lt1"/>
+            </a:fontRef>
+          </p:style>
+          <p:txBody>
+            <a:bodyPr rtlCol="0" anchor="ctr"/>
+            <a:lstStyle/>
+            <a:p>
+              <a:pPr algn="ctr"/>
+              <a:endParaRPr lang="zh-CN" altLang="en-US"/>
+            </a:p>
+          </p:txBody>
+        </p:sp>
+        <p:sp>
+          <p:nvSpPr>
+            <p:cNvPr id="17" name="椭圆 16"/>
+            <p:cNvSpPr/>
+            <p:nvPr/>
+          </p:nvSpPr>
+          <p:spPr>
+            <a:xfrm>
+              <a:off x="4411756" y="2420888"/>
+              <a:ext cx="198592" cy="219010"/>
+            </a:xfrm>
+            <a:prstGeom prst="ellipse">
+              <a:avLst/>
+            </a:prstGeom>
+          </p:spPr>
+          <p:style>
+            <a:lnRef idx="1">
+              <a:schemeClr val="accent2"/>
+            </a:lnRef>
+            <a:fillRef idx="3">
+              <a:schemeClr val="accent2"/>
+            </a:fillRef>
+            <a:effectRef idx="2">
+              <a:schemeClr val="accent2"/>
+            </a:effectRef>
+            <a:fontRef idx="minor">
+              <a:schemeClr val="lt1"/>
+            </a:fontRef>
+          </p:style>
+          <p:txBody>
+            <a:bodyPr rtlCol="0" anchor="ctr"/>
+            <a:lstStyle/>
+            <a:p>
+              <a:pPr algn="ctr"/>
+              <a:endParaRPr lang="zh-CN" altLang="en-US"/>
+            </a:p>
+          </p:txBody>
+        </p:sp>
+        <p:sp>
+          <p:nvSpPr>
+            <p:cNvPr id="18" name="椭圆 17"/>
+            <p:cNvSpPr/>
+            <p:nvPr/>
+          </p:nvSpPr>
+          <p:spPr>
+            <a:xfrm>
+              <a:off x="4989915" y="2898965"/>
+              <a:ext cx="198592" cy="219010"/>
+            </a:xfrm>
+            <a:prstGeom prst="ellipse">
+              <a:avLst/>
+            </a:prstGeom>
+          </p:spPr>
+          <p:style>
+            <a:lnRef idx="1">
+              <a:schemeClr val="accent2"/>
+            </a:lnRef>
+            <a:fillRef idx="3">
+              <a:schemeClr val="accent2"/>
+            </a:fillRef>
+            <a:effectRef idx="2">
+              <a:schemeClr val="accent2"/>
+            </a:effectRef>
+            <a:fontRef idx="minor">
+              <a:schemeClr val="lt1"/>
+            </a:fontRef>
+          </p:style>
+          <p:txBody>
+            <a:bodyPr rtlCol="0" anchor="ctr"/>
+            <a:lstStyle/>
+            <a:p>
+              <a:pPr algn="ctr"/>
+              <a:endParaRPr lang="zh-CN" altLang="en-US"/>
+            </a:p>
+          </p:txBody>
+        </p:sp>
+        <p:sp>
+          <p:nvSpPr>
+            <p:cNvPr id="19" name="椭圆 18"/>
+            <p:cNvSpPr/>
+            <p:nvPr/>
+          </p:nvSpPr>
+          <p:spPr>
+            <a:xfrm>
+              <a:off x="5676459" y="5099360"/>
+              <a:ext cx="198592" cy="219010"/>
+            </a:xfrm>
+            <a:prstGeom prst="ellipse">
+              <a:avLst/>
+            </a:prstGeom>
+          </p:spPr>
+          <p:style>
+            <a:lnRef idx="1">
+              <a:schemeClr val="accent2"/>
+            </a:lnRef>
+            <a:fillRef idx="3">
+              <a:schemeClr val="accent2"/>
+            </a:fillRef>
+            <a:effectRef idx="2">
+              <a:schemeClr val="accent2"/>
+            </a:effectRef>
+            <a:fontRef idx="minor">
+              <a:schemeClr val="lt1"/>
+            </a:fontRef>
+          </p:style>
+          <p:txBody>
+            <a:bodyPr rtlCol="0" anchor="ctr"/>
+            <a:lstStyle/>
+            <a:p>
+              <a:pPr algn="ctr"/>
+              <a:endParaRPr lang="zh-CN" altLang="en-US"/>
+            </a:p>
+          </p:txBody>
+        </p:sp>
+        <p:sp>
+          <p:nvSpPr>
+            <p:cNvPr id="20" name="椭圆 19"/>
+            <p:cNvSpPr/>
+            <p:nvPr/>
+          </p:nvSpPr>
+          <p:spPr>
+            <a:xfrm>
+              <a:off x="6876256" y="5737616"/>
+              <a:ext cx="198592" cy="219010"/>
+            </a:xfrm>
+            <a:prstGeom prst="ellipse">
+              <a:avLst/>
+            </a:prstGeom>
+          </p:spPr>
+          <p:style>
+            <a:lnRef idx="1">
+              <a:schemeClr val="accent2"/>
+            </a:lnRef>
+            <a:fillRef idx="3">
+              <a:schemeClr val="accent2"/>
+            </a:fillRef>
+            <a:effectRef idx="2">
+              <a:schemeClr val="accent2"/>
+            </a:effectRef>
+            <a:fontRef idx="minor">
+              <a:schemeClr val="lt1"/>
+            </a:fontRef>
+          </p:style>
+          <p:txBody>
+            <a:bodyPr rtlCol="0" anchor="ctr"/>
+            <a:lstStyle/>
+            <a:p>
+              <a:pPr algn="ctr"/>
+              <a:endParaRPr lang="zh-CN" altLang="en-US"/>
+            </a:p>
+          </p:txBody>
+        </p:sp>
+        <p:sp>
+          <p:nvSpPr>
+            <p:cNvPr id="21" name="椭圆 20"/>
+            <p:cNvSpPr/>
+            <p:nvPr/>
+          </p:nvSpPr>
+          <p:spPr>
+            <a:xfrm>
+              <a:off x="8430509" y="5883797"/>
+              <a:ext cx="198592" cy="219010"/>
+            </a:xfrm>
+            <a:prstGeom prst="ellipse">
+              <a:avLst/>
+            </a:prstGeom>
+          </p:spPr>
+          <p:style>
+            <a:lnRef idx="1">
+              <a:schemeClr val="accent2"/>
+            </a:lnRef>
+            <a:fillRef idx="3">
+              <a:schemeClr val="accent2"/>
+            </a:fillRef>
+            <a:effectRef idx="2">
+              <a:schemeClr val="accent2"/>
+            </a:effectRef>
+            <a:fontRef idx="minor">
+              <a:schemeClr val="lt1"/>
+            </a:fontRef>
+          </p:style>
+          <p:txBody>
+            <a:bodyPr rtlCol="0" anchor="ctr"/>
+            <a:lstStyle/>
+            <a:p>
+              <a:pPr algn="ctr"/>
+              <a:endParaRPr lang="zh-CN" altLang="en-US"/>
+            </a:p>
+          </p:txBody>
+        </p:sp>
+        <p:cxnSp>
+          <p:nvCxnSpPr>
+            <p:cNvPr id="23" name="直接连接符 22"/>
+            <p:cNvCxnSpPr>
+              <a:stCxn id="13" idx="6"/>
+              <a:endCxn id="14" idx="2"/>
+            </p:cNvCxnSpPr>
+            <p:nvPr/>
+          </p:nvCxnSpPr>
+          <p:spPr>
+            <a:xfrm flipV="1">
+              <a:off x="561870" y="5883797"/>
+              <a:ext cx="1633866" cy="172002"/>
+            </a:xfrm>
+            <a:prstGeom prst="line">
+              <a:avLst/>
+            </a:prstGeom>
+            <a:ln w="63500">
+              <a:solidFill>
+                <a:srgbClr val="00B0F0"/>
+              </a:solidFill>
+              <a:prstDash val="sysDash"/>
+            </a:ln>
+          </p:spPr>
+          <p:style>
+            <a:lnRef idx="1">
+              <a:schemeClr val="accent1"/>
+            </a:lnRef>
+            <a:fillRef idx="0">
+              <a:schemeClr val="accent1"/>
+            </a:fillRef>
+            <a:effectRef idx="0">
+              <a:schemeClr val="accent1"/>
+            </a:effectRef>
+            <a:fontRef idx="minor">
+              <a:schemeClr val="tx1"/>
+            </a:fontRef>
+          </p:style>
+        </p:cxnSp>
+        <p:cxnSp>
+          <p:nvCxnSpPr>
+            <p:cNvPr id="25" name="直接连接符 24"/>
+            <p:cNvCxnSpPr>
+              <a:stCxn id="14" idx="6"/>
+              <a:endCxn id="15" idx="3"/>
+            </p:cNvCxnSpPr>
+            <p:nvPr/>
+          </p:nvCxnSpPr>
+          <p:spPr>
+            <a:xfrm flipV="1">
+              <a:off x="2394328" y="5395802"/>
+              <a:ext cx="838603" cy="487995"/>
+            </a:xfrm>
+            <a:prstGeom prst="line">
+              <a:avLst/>
+            </a:prstGeom>
+            <a:ln w="63500">
+              <a:solidFill>
+                <a:srgbClr val="00B0F0"/>
+              </a:solidFill>
+              <a:prstDash val="sysDash"/>
+            </a:ln>
+          </p:spPr>
+          <p:style>
+            <a:lnRef idx="1">
+              <a:schemeClr val="accent1"/>
+            </a:lnRef>
+            <a:fillRef idx="0">
+              <a:schemeClr val="accent1"/>
+            </a:fillRef>
+            <a:effectRef idx="0">
+              <a:schemeClr val="accent1"/>
+            </a:effectRef>
+            <a:fontRef idx="minor">
+              <a:schemeClr val="tx1"/>
+            </a:fontRef>
+          </p:style>
+        </p:cxnSp>
+        <p:cxnSp>
+          <p:nvCxnSpPr>
+            <p:cNvPr id="28" name="直接连接符 27"/>
+            <p:cNvCxnSpPr>
+              <a:stCxn id="15" idx="7"/>
+              <a:endCxn id="16" idx="4"/>
+            </p:cNvCxnSpPr>
+            <p:nvPr/>
+          </p:nvCxnSpPr>
+          <p:spPr>
+            <a:xfrm flipV="1">
+              <a:off x="3373357" y="3143954"/>
+              <a:ext cx="577859" cy="2096984"/>
+            </a:xfrm>
+            <a:prstGeom prst="line">
+              <a:avLst/>
+            </a:prstGeom>
+            <a:ln w="63500">
+              <a:solidFill>
+                <a:srgbClr val="00B0F0"/>
+              </a:solidFill>
+              <a:prstDash val="sysDash"/>
+            </a:ln>
+          </p:spPr>
+          <p:style>
+            <a:lnRef idx="1">
+              <a:schemeClr val="accent1"/>
+            </a:lnRef>
+            <a:fillRef idx="0">
+              <a:schemeClr val="accent1"/>
+            </a:fillRef>
+            <a:effectRef idx="0">
+              <a:schemeClr val="accent1"/>
+            </a:effectRef>
+            <a:fontRef idx="minor">
+              <a:schemeClr val="tx1"/>
+            </a:fontRef>
+          </p:style>
+        </p:cxnSp>
+        <p:cxnSp>
+          <p:nvCxnSpPr>
+            <p:cNvPr id="31" name="直接连接符 30"/>
+            <p:cNvCxnSpPr>
+              <a:stCxn id="16" idx="7"/>
+              <a:endCxn id="17" idx="3"/>
+            </p:cNvCxnSpPr>
+            <p:nvPr/>
+          </p:nvCxnSpPr>
+          <p:spPr>
+            <a:xfrm flipV="1">
+              <a:off x="4021429" y="2607825"/>
+              <a:ext cx="419410" cy="349192"/>
+            </a:xfrm>
+            <a:prstGeom prst="line">
+              <a:avLst/>
+            </a:prstGeom>
+            <a:ln w="63500">
+              <a:solidFill>
+                <a:srgbClr val="00B0F0"/>
+              </a:solidFill>
+              <a:prstDash val="sysDash"/>
+            </a:ln>
+          </p:spPr>
+          <p:style>
+            <a:lnRef idx="1">
+              <a:schemeClr val="accent1"/>
+            </a:lnRef>
+            <a:fillRef idx="0">
+              <a:schemeClr val="accent1"/>
+            </a:fillRef>
+            <a:effectRef idx="0">
+              <a:schemeClr val="accent1"/>
+            </a:effectRef>
+            <a:fontRef idx="minor">
+              <a:schemeClr val="tx1"/>
+            </a:fontRef>
+          </p:style>
+        </p:cxnSp>
+        <p:cxnSp>
+          <p:nvCxnSpPr>
+            <p:cNvPr id="32" name="直接连接符 31"/>
+            <p:cNvCxnSpPr>
+              <a:stCxn id="17" idx="5"/>
+              <a:endCxn id="18" idx="2"/>
+            </p:cNvCxnSpPr>
+            <p:nvPr/>
+          </p:nvCxnSpPr>
+          <p:spPr>
+            <a:xfrm>
+              <a:off x="4581265" y="2607825"/>
+              <a:ext cx="408650" cy="400645"/>
+            </a:xfrm>
+            <a:prstGeom prst="line">
+              <a:avLst/>
+            </a:prstGeom>
+            <a:ln w="63500">
+              <a:solidFill>
+                <a:srgbClr val="00B0F0"/>
+              </a:solidFill>
+              <a:prstDash val="sysDash"/>
+            </a:ln>
+          </p:spPr>
+          <p:style>
+            <a:lnRef idx="1">
+              <a:schemeClr val="accent1"/>
+            </a:lnRef>
+            <a:fillRef idx="0">
+              <a:schemeClr val="accent1"/>
+            </a:fillRef>
+            <a:effectRef idx="0">
+              <a:schemeClr val="accent1"/>
+            </a:effectRef>
+            <a:fontRef idx="minor">
+              <a:schemeClr val="tx1"/>
+            </a:fontRef>
+          </p:style>
+        </p:cxnSp>
+        <p:cxnSp>
+          <p:nvCxnSpPr>
+            <p:cNvPr id="33" name="直接连接符 32"/>
+            <p:cNvCxnSpPr>
+              <a:stCxn id="19" idx="5"/>
+              <a:endCxn id="20" idx="1"/>
+            </p:cNvCxnSpPr>
+            <p:nvPr/>
+          </p:nvCxnSpPr>
+          <p:spPr>
+            <a:xfrm>
+              <a:off x="5845968" y="5286297"/>
+              <a:ext cx="1059371" cy="483392"/>
+            </a:xfrm>
+            <a:prstGeom prst="line">
+              <a:avLst/>
+            </a:prstGeom>
+            <a:ln w="63500">
+              <a:solidFill>
+                <a:srgbClr val="00B0F0"/>
+              </a:solidFill>
+              <a:prstDash val="sysDash"/>
+            </a:ln>
+          </p:spPr>
+          <p:style>
+            <a:lnRef idx="1">
+              <a:schemeClr val="accent1"/>
+            </a:lnRef>
+            <a:fillRef idx="0">
+              <a:schemeClr val="accent1"/>
+            </a:fillRef>
+            <a:effectRef idx="0">
+              <a:schemeClr val="accent1"/>
+            </a:effectRef>
+            <a:fontRef idx="minor">
+              <a:schemeClr val="tx1"/>
+            </a:fontRef>
+          </p:style>
+        </p:cxnSp>
+        <p:cxnSp>
+          <p:nvCxnSpPr>
+            <p:cNvPr id="34" name="直接连接符 33"/>
+            <p:cNvCxnSpPr>
+              <a:stCxn id="18" idx="5"/>
+              <a:endCxn id="19" idx="0"/>
+            </p:cNvCxnSpPr>
+            <p:nvPr/>
+          </p:nvCxnSpPr>
+          <p:spPr>
+            <a:xfrm>
+              <a:off x="5159424" y="3085902"/>
+              <a:ext cx="616331" cy="2013458"/>
+            </a:xfrm>
+            <a:prstGeom prst="line">
+              <a:avLst/>
+            </a:prstGeom>
+            <a:ln w="63500">
+              <a:solidFill>
+                <a:srgbClr val="00B0F0"/>
+              </a:solidFill>
+              <a:prstDash val="sysDash"/>
+            </a:ln>
+          </p:spPr>
+          <p:style>
+            <a:lnRef idx="1">
+              <a:schemeClr val="accent1"/>
+            </a:lnRef>
+            <a:fillRef idx="0">
+              <a:schemeClr val="accent1"/>
+            </a:fillRef>
+            <a:effectRef idx="0">
+              <a:schemeClr val="accent1"/>
+            </a:effectRef>
+            <a:fontRef idx="minor">
+              <a:schemeClr val="tx1"/>
+            </a:fontRef>
+          </p:style>
+        </p:cxnSp>
+        <p:cxnSp>
+          <p:nvCxnSpPr>
+            <p:cNvPr id="43" name="直接连接符 42"/>
+            <p:cNvCxnSpPr>
+              <a:stCxn id="20" idx="5"/>
+              <a:endCxn id="21" idx="2"/>
+            </p:cNvCxnSpPr>
+            <p:nvPr/>
+          </p:nvCxnSpPr>
+          <p:spPr>
+            <a:xfrm>
+              <a:off x="7045765" y="5924553"/>
+              <a:ext cx="1384744" cy="68749"/>
+            </a:xfrm>
+            <a:prstGeom prst="line">
+              <a:avLst/>
+            </a:prstGeom>
+            <a:ln w="63500">
+              <a:solidFill>
+                <a:srgbClr val="00B0F0"/>
+              </a:solidFill>
+              <a:prstDash val="sysDash"/>
+            </a:ln>
+          </p:spPr>
+          <p:style>
+            <a:lnRef idx="1">
+              <a:schemeClr val="accent1"/>
+            </a:lnRef>
+            <a:fillRef idx="0">
+              <a:schemeClr val="accent1"/>
+            </a:fillRef>
+            <a:effectRef idx="0">
+              <a:schemeClr val="accent1"/>
+            </a:effectRef>
+            <a:fontRef idx="minor">
+              <a:schemeClr val="tx1"/>
+            </a:fontRef>
+          </p:style>
+        </p:cxnSp>
+      </p:grpSp>
+    </p:spTree>
+    <p:extLst>
+      <p:ext uri="{BB962C8B-B14F-4D97-AF65-F5344CB8AC3E}">
+        <p14:creationId xmlns:p14="http://schemas.microsoft.com/office/powerpoint/2010/main" val="871263022"/>
+      </p:ext>
+    </p:extLst>
+  </p:cSld>
+  <p:clrMapOvr>
+    <a:masterClrMapping/>
+  </p:clrMapOvr>
+  <p:timing>
+    <p:tnLst>
+      <p:par>
+        <p:cTn id="1" dur="indefinite" restart="never" nodeType="tmRoot"/>
+      </p:par>
+    </p:tnLst>
+  </p:timing>
 </p:sld>
 </file>
 

</xml_diff>

<commit_message>
fix error in the figure
</commit_message>
<xml_diff>
--- a/Manuscript/chemical_graph.pptx
+++ b/Manuscript/chemical_graph.pptx
@@ -6553,87 +6553,883 @@
       </p:grpSpPr>
       <p:grpSp>
         <p:nvGrpSpPr>
-          <p:cNvPr id="8" name="组合 7"/>
+          <p:cNvPr id="3" name="组合 2"/>
           <p:cNvGrpSpPr/>
           <p:nvPr/>
         </p:nvGrpSpPr>
         <p:grpSpPr>
           <a:xfrm>
-            <a:off x="300290" y="883748"/>
-            <a:ext cx="8647588" cy="5578879"/>
-            <a:chOff x="363278" y="1268760"/>
-            <a:chExt cx="8647588" cy="5578879"/>
+            <a:off x="300290" y="774243"/>
+            <a:ext cx="8583813" cy="5393738"/>
+            <a:chOff x="300290" y="774243"/>
+            <a:chExt cx="8583813" cy="5393738"/>
           </a:xfrm>
         </p:grpSpPr>
         <p:grpSp>
           <p:nvGrpSpPr>
-            <p:cNvPr id="46" name="组合 45"/>
+            <p:cNvPr id="8" name="组合 7"/>
             <p:cNvGrpSpPr/>
             <p:nvPr/>
           </p:nvGrpSpPr>
           <p:grpSpPr>
             <a:xfrm>
-              <a:off x="363278" y="1268760"/>
-              <a:ext cx="8580294" cy="5209547"/>
+              <a:off x="300290" y="883748"/>
+              <a:ext cx="8583813" cy="5281294"/>
               <a:chOff x="363278" y="1268760"/>
-              <a:chExt cx="8580294" cy="5209547"/>
+              <a:chExt cx="8583813" cy="5281294"/>
             </a:xfrm>
           </p:grpSpPr>
+          <p:grpSp>
+            <p:nvGrpSpPr>
+              <p:cNvPr id="46" name="组合 45"/>
+              <p:cNvGrpSpPr/>
+              <p:nvPr/>
+            </p:nvGrpSpPr>
+            <p:grpSpPr>
+              <a:xfrm>
+                <a:off x="363278" y="1268760"/>
+                <a:ext cx="8580294" cy="5209547"/>
+                <a:chOff x="363278" y="1268760"/>
+                <a:chExt cx="8580294" cy="5209547"/>
+              </a:xfrm>
+            </p:grpSpPr>
+            <p:cxnSp>
+              <p:nvCxnSpPr>
+                <p:cNvPr id="5" name="直接箭头连接符 4"/>
+                <p:cNvCxnSpPr/>
+                <p:nvPr/>
+              </p:nvCxnSpPr>
+              <p:spPr>
+                <a:xfrm>
+                  <a:off x="489862" y="6077617"/>
+                  <a:ext cx="8418264" cy="0"/>
+                </a:xfrm>
+                <a:prstGeom prst="straightConnector1">
+                  <a:avLst/>
+                </a:prstGeom>
+                <a:ln w="63500">
+                  <a:solidFill>
+                    <a:schemeClr val="tx1"/>
+                  </a:solidFill>
+                  <a:tailEnd type="triangle"/>
+                </a:ln>
+              </p:spPr>
+              <p:style>
+                <a:lnRef idx="1">
+                  <a:schemeClr val="accent1"/>
+                </a:lnRef>
+                <a:fillRef idx="0">
+                  <a:schemeClr val="accent1"/>
+                </a:fillRef>
+                <a:effectRef idx="0">
+                  <a:schemeClr val="accent1"/>
+                </a:effectRef>
+                <a:fontRef idx="minor">
+                  <a:schemeClr val="tx1"/>
+                </a:fontRef>
+              </p:style>
+            </p:cxnSp>
+            <p:cxnSp>
+              <p:nvCxnSpPr>
+                <p:cNvPr id="6" name="直接箭头连接符 5"/>
+                <p:cNvCxnSpPr/>
+                <p:nvPr/>
+              </p:nvCxnSpPr>
+              <p:spPr>
+                <a:xfrm flipV="1">
+                  <a:off x="489862" y="1268760"/>
+                  <a:ext cx="0" cy="4808857"/>
+                </a:xfrm>
+                <a:prstGeom prst="straightConnector1">
+                  <a:avLst/>
+                </a:prstGeom>
+                <a:ln w="63500">
+                  <a:solidFill>
+                    <a:schemeClr val="tx1"/>
+                  </a:solidFill>
+                  <a:tailEnd type="triangle"/>
+                </a:ln>
+              </p:spPr>
+              <p:style>
+                <a:lnRef idx="1">
+                  <a:schemeClr val="accent1"/>
+                </a:lnRef>
+                <a:fillRef idx="0">
+                  <a:schemeClr val="accent1"/>
+                </a:fillRef>
+                <a:effectRef idx="0">
+                  <a:schemeClr val="accent1"/>
+                </a:effectRef>
+                <a:fontRef idx="minor">
+                  <a:schemeClr val="tx1"/>
+                </a:fontRef>
+              </p:style>
+            </p:cxnSp>
+            <p:sp>
+              <p:nvSpPr>
+                <p:cNvPr id="9" name="TextBox 8"/>
+                <p:cNvSpPr txBox="1"/>
+                <p:nvPr/>
+              </p:nvSpPr>
+              <p:spPr>
+                <a:xfrm>
+                  <a:off x="8116038" y="6108975"/>
+                  <a:ext cx="827534" cy="369332"/>
+                </a:xfrm>
+                <a:prstGeom prst="rect">
+                  <a:avLst/>
+                </a:prstGeom>
+                <a:noFill/>
+              </p:spPr>
+              <p:txBody>
+                <a:bodyPr wrap="none" rtlCol="0">
+                  <a:spAutoFit/>
+                </a:bodyPr>
+                <a:lstStyle/>
+                <a:p>
+                  <a:r>
+                    <a:rPr lang="en-US" altLang="zh-CN" dirty="0" smtClean="0"/>
+                    <a:t>energy</a:t>
+                  </a:r>
+                  <a:endParaRPr lang="zh-CN" altLang="en-US" dirty="0"/>
+                </a:p>
+              </p:txBody>
+            </p:sp>
+            <p:sp>
+              <p:nvSpPr>
+                <p:cNvPr id="10" name="TextBox 9"/>
+                <p:cNvSpPr txBox="1"/>
+                <p:nvPr/>
+              </p:nvSpPr>
+              <p:spPr>
+                <a:xfrm>
+                  <a:off x="561870" y="1484784"/>
+                  <a:ext cx="969624" cy="369332"/>
+                </a:xfrm>
+                <a:prstGeom prst="rect">
+                  <a:avLst/>
+                </a:prstGeom>
+                <a:noFill/>
+              </p:spPr>
+              <p:txBody>
+                <a:bodyPr wrap="none" rtlCol="0">
+                  <a:spAutoFit/>
+                </a:bodyPr>
+                <a:lstStyle/>
+                <a:p>
+                  <a:r>
+                    <a:rPr lang="en-US" altLang="zh-CN" dirty="0" smtClean="0"/>
+                    <a:t>quantity</a:t>
+                  </a:r>
+                  <a:endParaRPr lang="zh-CN" altLang="en-US" dirty="0"/>
+                </a:p>
+              </p:txBody>
+            </p:sp>
+            <p:sp>
+              <p:nvSpPr>
+                <p:cNvPr id="13" name="椭圆 12"/>
+                <p:cNvSpPr/>
+                <p:nvPr/>
+              </p:nvSpPr>
+              <p:spPr>
+                <a:xfrm>
+                  <a:off x="363278" y="5946294"/>
+                  <a:ext cx="198592" cy="219010"/>
+                </a:xfrm>
+                <a:prstGeom prst="ellipse">
+                  <a:avLst/>
+                </a:prstGeom>
+              </p:spPr>
+              <p:style>
+                <a:lnRef idx="1">
+                  <a:schemeClr val="accent2"/>
+                </a:lnRef>
+                <a:fillRef idx="3">
+                  <a:schemeClr val="accent2"/>
+                </a:fillRef>
+                <a:effectRef idx="2">
+                  <a:schemeClr val="accent2"/>
+                </a:effectRef>
+                <a:fontRef idx="minor">
+                  <a:schemeClr val="lt1"/>
+                </a:fontRef>
+              </p:style>
+              <p:txBody>
+                <a:bodyPr rtlCol="0" anchor="ctr"/>
+                <a:lstStyle/>
+                <a:p>
+                  <a:pPr algn="ctr"/>
+                  <a:endParaRPr lang="zh-CN" altLang="en-US"/>
+                </a:p>
+              </p:txBody>
+            </p:sp>
+            <p:sp>
+              <p:nvSpPr>
+                <p:cNvPr id="14" name="椭圆 13"/>
+                <p:cNvSpPr/>
+                <p:nvPr/>
+              </p:nvSpPr>
+              <p:spPr>
+                <a:xfrm>
+                  <a:off x="2195736" y="5774292"/>
+                  <a:ext cx="198592" cy="219010"/>
+                </a:xfrm>
+                <a:prstGeom prst="ellipse">
+                  <a:avLst/>
+                </a:prstGeom>
+              </p:spPr>
+              <p:style>
+                <a:lnRef idx="1">
+                  <a:schemeClr val="accent2"/>
+                </a:lnRef>
+                <a:fillRef idx="3">
+                  <a:schemeClr val="accent2"/>
+                </a:fillRef>
+                <a:effectRef idx="2">
+                  <a:schemeClr val="accent2"/>
+                </a:effectRef>
+                <a:fontRef idx="minor">
+                  <a:schemeClr val="lt1"/>
+                </a:fontRef>
+              </p:style>
+              <p:txBody>
+                <a:bodyPr rtlCol="0" anchor="ctr"/>
+                <a:lstStyle/>
+                <a:p>
+                  <a:pPr algn="ctr"/>
+                  <a:endParaRPr lang="zh-CN" altLang="en-US"/>
+                </a:p>
+              </p:txBody>
+            </p:sp>
+            <p:sp>
+              <p:nvSpPr>
+                <p:cNvPr id="15" name="椭圆 14"/>
+                <p:cNvSpPr/>
+                <p:nvPr/>
+              </p:nvSpPr>
+              <p:spPr>
+                <a:xfrm>
+                  <a:off x="3203848" y="5208865"/>
+                  <a:ext cx="198592" cy="219010"/>
+                </a:xfrm>
+                <a:prstGeom prst="ellipse">
+                  <a:avLst/>
+                </a:prstGeom>
+              </p:spPr>
+              <p:style>
+                <a:lnRef idx="1">
+                  <a:schemeClr val="accent2"/>
+                </a:lnRef>
+                <a:fillRef idx="3">
+                  <a:schemeClr val="accent2"/>
+                </a:fillRef>
+                <a:effectRef idx="2">
+                  <a:schemeClr val="accent2"/>
+                </a:effectRef>
+                <a:fontRef idx="minor">
+                  <a:schemeClr val="lt1"/>
+                </a:fontRef>
+              </p:style>
+              <p:txBody>
+                <a:bodyPr rtlCol="0" anchor="ctr"/>
+                <a:lstStyle/>
+                <a:p>
+                  <a:pPr algn="ctr"/>
+                  <a:endParaRPr lang="zh-CN" altLang="en-US"/>
+                </a:p>
+              </p:txBody>
+            </p:sp>
+            <p:sp>
+              <p:nvSpPr>
+                <p:cNvPr id="16" name="椭圆 15"/>
+                <p:cNvSpPr/>
+                <p:nvPr/>
+              </p:nvSpPr>
+              <p:spPr>
+                <a:xfrm>
+                  <a:off x="3851920" y="2924944"/>
+                  <a:ext cx="198592" cy="219010"/>
+                </a:xfrm>
+                <a:prstGeom prst="ellipse">
+                  <a:avLst/>
+                </a:prstGeom>
+              </p:spPr>
+              <p:style>
+                <a:lnRef idx="1">
+                  <a:schemeClr val="accent2"/>
+                </a:lnRef>
+                <a:fillRef idx="3">
+                  <a:schemeClr val="accent2"/>
+                </a:fillRef>
+                <a:effectRef idx="2">
+                  <a:schemeClr val="accent2"/>
+                </a:effectRef>
+                <a:fontRef idx="minor">
+                  <a:schemeClr val="lt1"/>
+                </a:fontRef>
+              </p:style>
+              <p:txBody>
+                <a:bodyPr rtlCol="0" anchor="ctr"/>
+                <a:lstStyle/>
+                <a:p>
+                  <a:pPr algn="ctr"/>
+                  <a:endParaRPr lang="zh-CN" altLang="en-US"/>
+                </a:p>
+              </p:txBody>
+            </p:sp>
+            <p:sp>
+              <p:nvSpPr>
+                <p:cNvPr id="17" name="椭圆 16"/>
+                <p:cNvSpPr/>
+                <p:nvPr/>
+              </p:nvSpPr>
+              <p:spPr>
+                <a:xfrm>
+                  <a:off x="4411756" y="2420888"/>
+                  <a:ext cx="198592" cy="219010"/>
+                </a:xfrm>
+                <a:prstGeom prst="ellipse">
+                  <a:avLst/>
+                </a:prstGeom>
+              </p:spPr>
+              <p:style>
+                <a:lnRef idx="1">
+                  <a:schemeClr val="accent2"/>
+                </a:lnRef>
+                <a:fillRef idx="3">
+                  <a:schemeClr val="accent2"/>
+                </a:fillRef>
+                <a:effectRef idx="2">
+                  <a:schemeClr val="accent2"/>
+                </a:effectRef>
+                <a:fontRef idx="minor">
+                  <a:schemeClr val="lt1"/>
+                </a:fontRef>
+              </p:style>
+              <p:txBody>
+                <a:bodyPr rtlCol="0" anchor="ctr"/>
+                <a:lstStyle/>
+                <a:p>
+                  <a:pPr algn="ctr"/>
+                  <a:endParaRPr lang="zh-CN" altLang="en-US"/>
+                </a:p>
+              </p:txBody>
+            </p:sp>
+            <p:sp>
+              <p:nvSpPr>
+                <p:cNvPr id="18" name="椭圆 17"/>
+                <p:cNvSpPr/>
+                <p:nvPr/>
+              </p:nvSpPr>
+              <p:spPr>
+                <a:xfrm>
+                  <a:off x="4989915" y="2898965"/>
+                  <a:ext cx="198592" cy="219010"/>
+                </a:xfrm>
+                <a:prstGeom prst="ellipse">
+                  <a:avLst/>
+                </a:prstGeom>
+              </p:spPr>
+              <p:style>
+                <a:lnRef idx="1">
+                  <a:schemeClr val="accent2"/>
+                </a:lnRef>
+                <a:fillRef idx="3">
+                  <a:schemeClr val="accent2"/>
+                </a:fillRef>
+                <a:effectRef idx="2">
+                  <a:schemeClr val="accent2"/>
+                </a:effectRef>
+                <a:fontRef idx="minor">
+                  <a:schemeClr val="lt1"/>
+                </a:fontRef>
+              </p:style>
+              <p:txBody>
+                <a:bodyPr rtlCol="0" anchor="ctr"/>
+                <a:lstStyle/>
+                <a:p>
+                  <a:pPr algn="ctr"/>
+                  <a:endParaRPr lang="zh-CN" altLang="en-US"/>
+                </a:p>
+              </p:txBody>
+            </p:sp>
+            <p:sp>
+              <p:nvSpPr>
+                <p:cNvPr id="19" name="椭圆 18"/>
+                <p:cNvSpPr/>
+                <p:nvPr/>
+              </p:nvSpPr>
+              <p:spPr>
+                <a:xfrm>
+                  <a:off x="5676459" y="5099360"/>
+                  <a:ext cx="198592" cy="219010"/>
+                </a:xfrm>
+                <a:prstGeom prst="ellipse">
+                  <a:avLst/>
+                </a:prstGeom>
+              </p:spPr>
+              <p:style>
+                <a:lnRef idx="1">
+                  <a:schemeClr val="accent2"/>
+                </a:lnRef>
+                <a:fillRef idx="3">
+                  <a:schemeClr val="accent2"/>
+                </a:fillRef>
+                <a:effectRef idx="2">
+                  <a:schemeClr val="accent2"/>
+                </a:effectRef>
+                <a:fontRef idx="minor">
+                  <a:schemeClr val="lt1"/>
+                </a:fontRef>
+              </p:style>
+              <p:txBody>
+                <a:bodyPr rtlCol="0" anchor="ctr"/>
+                <a:lstStyle/>
+                <a:p>
+                  <a:pPr algn="ctr"/>
+                  <a:endParaRPr lang="zh-CN" altLang="en-US"/>
+                </a:p>
+              </p:txBody>
+            </p:sp>
+            <p:sp>
+              <p:nvSpPr>
+                <p:cNvPr id="20" name="椭圆 19"/>
+                <p:cNvSpPr/>
+                <p:nvPr/>
+              </p:nvSpPr>
+              <p:spPr>
+                <a:xfrm>
+                  <a:off x="6876256" y="5737616"/>
+                  <a:ext cx="198592" cy="219010"/>
+                </a:xfrm>
+                <a:prstGeom prst="ellipse">
+                  <a:avLst/>
+                </a:prstGeom>
+              </p:spPr>
+              <p:style>
+                <a:lnRef idx="1">
+                  <a:schemeClr val="accent2"/>
+                </a:lnRef>
+                <a:fillRef idx="3">
+                  <a:schemeClr val="accent2"/>
+                </a:fillRef>
+                <a:effectRef idx="2">
+                  <a:schemeClr val="accent2"/>
+                </a:effectRef>
+                <a:fontRef idx="minor">
+                  <a:schemeClr val="lt1"/>
+                </a:fontRef>
+              </p:style>
+              <p:txBody>
+                <a:bodyPr rtlCol="0" anchor="ctr"/>
+                <a:lstStyle/>
+                <a:p>
+                  <a:pPr algn="ctr"/>
+                  <a:endParaRPr lang="zh-CN" altLang="en-US"/>
+                </a:p>
+              </p:txBody>
+            </p:sp>
+            <p:sp>
+              <p:nvSpPr>
+                <p:cNvPr id="21" name="椭圆 20"/>
+                <p:cNvSpPr/>
+                <p:nvPr/>
+              </p:nvSpPr>
+              <p:spPr>
+                <a:xfrm>
+                  <a:off x="8430509" y="5883797"/>
+                  <a:ext cx="198592" cy="219010"/>
+                </a:xfrm>
+                <a:prstGeom prst="ellipse">
+                  <a:avLst/>
+                </a:prstGeom>
+              </p:spPr>
+              <p:style>
+                <a:lnRef idx="1">
+                  <a:schemeClr val="accent2"/>
+                </a:lnRef>
+                <a:fillRef idx="3">
+                  <a:schemeClr val="accent2"/>
+                </a:fillRef>
+                <a:effectRef idx="2">
+                  <a:schemeClr val="accent2"/>
+                </a:effectRef>
+                <a:fontRef idx="minor">
+                  <a:schemeClr val="lt1"/>
+                </a:fontRef>
+              </p:style>
+              <p:txBody>
+                <a:bodyPr rtlCol="0" anchor="ctr"/>
+                <a:lstStyle/>
+                <a:p>
+                  <a:pPr algn="ctr"/>
+                  <a:endParaRPr lang="zh-CN" altLang="en-US"/>
+                </a:p>
+              </p:txBody>
+            </p:sp>
+            <p:cxnSp>
+              <p:nvCxnSpPr>
+                <p:cNvPr id="23" name="直接连接符 22"/>
+                <p:cNvCxnSpPr>
+                  <a:stCxn id="13" idx="6"/>
+                  <a:endCxn id="14" idx="2"/>
+                </p:cNvCxnSpPr>
+                <p:nvPr/>
+              </p:nvCxnSpPr>
+              <p:spPr>
+                <a:xfrm flipV="1">
+                  <a:off x="561870" y="5883797"/>
+                  <a:ext cx="1633866" cy="172002"/>
+                </a:xfrm>
+                <a:prstGeom prst="line">
+                  <a:avLst/>
+                </a:prstGeom>
+                <a:ln w="63500">
+                  <a:solidFill>
+                    <a:srgbClr val="00B0F0"/>
+                  </a:solidFill>
+                  <a:prstDash val="sysDash"/>
+                </a:ln>
+              </p:spPr>
+              <p:style>
+                <a:lnRef idx="1">
+                  <a:schemeClr val="accent1"/>
+                </a:lnRef>
+                <a:fillRef idx="0">
+                  <a:schemeClr val="accent1"/>
+                </a:fillRef>
+                <a:effectRef idx="0">
+                  <a:schemeClr val="accent1"/>
+                </a:effectRef>
+                <a:fontRef idx="minor">
+                  <a:schemeClr val="tx1"/>
+                </a:fontRef>
+              </p:style>
+            </p:cxnSp>
+            <p:cxnSp>
+              <p:nvCxnSpPr>
+                <p:cNvPr id="25" name="直接连接符 24"/>
+                <p:cNvCxnSpPr>
+                  <a:stCxn id="14" idx="6"/>
+                  <a:endCxn id="15" idx="3"/>
+                </p:cNvCxnSpPr>
+                <p:nvPr/>
+              </p:nvCxnSpPr>
+              <p:spPr>
+                <a:xfrm flipV="1">
+                  <a:off x="2394328" y="5395802"/>
+                  <a:ext cx="838603" cy="487995"/>
+                </a:xfrm>
+                <a:prstGeom prst="line">
+                  <a:avLst/>
+                </a:prstGeom>
+                <a:ln w="63500">
+                  <a:solidFill>
+                    <a:srgbClr val="00B0F0"/>
+                  </a:solidFill>
+                  <a:prstDash val="sysDash"/>
+                </a:ln>
+              </p:spPr>
+              <p:style>
+                <a:lnRef idx="1">
+                  <a:schemeClr val="accent1"/>
+                </a:lnRef>
+                <a:fillRef idx="0">
+                  <a:schemeClr val="accent1"/>
+                </a:fillRef>
+                <a:effectRef idx="0">
+                  <a:schemeClr val="accent1"/>
+                </a:effectRef>
+                <a:fontRef idx="minor">
+                  <a:schemeClr val="tx1"/>
+                </a:fontRef>
+              </p:style>
+            </p:cxnSp>
+            <p:cxnSp>
+              <p:nvCxnSpPr>
+                <p:cNvPr id="28" name="直接连接符 27"/>
+                <p:cNvCxnSpPr>
+                  <a:stCxn id="15" idx="7"/>
+                  <a:endCxn id="16" idx="4"/>
+                </p:cNvCxnSpPr>
+                <p:nvPr/>
+              </p:nvCxnSpPr>
+              <p:spPr>
+                <a:xfrm flipV="1">
+                  <a:off x="3373357" y="3143954"/>
+                  <a:ext cx="577859" cy="2096984"/>
+                </a:xfrm>
+                <a:prstGeom prst="line">
+                  <a:avLst/>
+                </a:prstGeom>
+                <a:ln w="63500">
+                  <a:solidFill>
+                    <a:srgbClr val="00B0F0"/>
+                  </a:solidFill>
+                  <a:prstDash val="sysDash"/>
+                </a:ln>
+              </p:spPr>
+              <p:style>
+                <a:lnRef idx="1">
+                  <a:schemeClr val="accent1"/>
+                </a:lnRef>
+                <a:fillRef idx="0">
+                  <a:schemeClr val="accent1"/>
+                </a:fillRef>
+                <a:effectRef idx="0">
+                  <a:schemeClr val="accent1"/>
+                </a:effectRef>
+                <a:fontRef idx="minor">
+                  <a:schemeClr val="tx1"/>
+                </a:fontRef>
+              </p:style>
+            </p:cxnSp>
+            <p:cxnSp>
+              <p:nvCxnSpPr>
+                <p:cNvPr id="31" name="直接连接符 30"/>
+                <p:cNvCxnSpPr>
+                  <a:stCxn id="16" idx="7"/>
+                  <a:endCxn id="17" idx="3"/>
+                </p:cNvCxnSpPr>
+                <p:nvPr/>
+              </p:nvCxnSpPr>
+              <p:spPr>
+                <a:xfrm flipV="1">
+                  <a:off x="4021429" y="2607825"/>
+                  <a:ext cx="419410" cy="349192"/>
+                </a:xfrm>
+                <a:prstGeom prst="line">
+                  <a:avLst/>
+                </a:prstGeom>
+                <a:ln w="63500">
+                  <a:solidFill>
+                    <a:srgbClr val="00B0F0"/>
+                  </a:solidFill>
+                  <a:prstDash val="sysDash"/>
+                </a:ln>
+              </p:spPr>
+              <p:style>
+                <a:lnRef idx="1">
+                  <a:schemeClr val="accent1"/>
+                </a:lnRef>
+                <a:fillRef idx="0">
+                  <a:schemeClr val="accent1"/>
+                </a:fillRef>
+                <a:effectRef idx="0">
+                  <a:schemeClr val="accent1"/>
+                </a:effectRef>
+                <a:fontRef idx="minor">
+                  <a:schemeClr val="tx1"/>
+                </a:fontRef>
+              </p:style>
+            </p:cxnSp>
+            <p:cxnSp>
+              <p:nvCxnSpPr>
+                <p:cNvPr id="32" name="直接连接符 31"/>
+                <p:cNvCxnSpPr>
+                  <a:stCxn id="17" idx="5"/>
+                  <a:endCxn id="18" idx="2"/>
+                </p:cNvCxnSpPr>
+                <p:nvPr/>
+              </p:nvCxnSpPr>
+              <p:spPr>
+                <a:xfrm>
+                  <a:off x="4581265" y="2607825"/>
+                  <a:ext cx="408650" cy="400645"/>
+                </a:xfrm>
+                <a:prstGeom prst="line">
+                  <a:avLst/>
+                </a:prstGeom>
+                <a:ln w="63500">
+                  <a:solidFill>
+                    <a:srgbClr val="00B0F0"/>
+                  </a:solidFill>
+                  <a:prstDash val="sysDash"/>
+                </a:ln>
+              </p:spPr>
+              <p:style>
+                <a:lnRef idx="1">
+                  <a:schemeClr val="accent1"/>
+                </a:lnRef>
+                <a:fillRef idx="0">
+                  <a:schemeClr val="accent1"/>
+                </a:fillRef>
+                <a:effectRef idx="0">
+                  <a:schemeClr val="accent1"/>
+                </a:effectRef>
+                <a:fontRef idx="minor">
+                  <a:schemeClr val="tx1"/>
+                </a:fontRef>
+              </p:style>
+            </p:cxnSp>
+            <p:cxnSp>
+              <p:nvCxnSpPr>
+                <p:cNvPr id="33" name="直接连接符 32"/>
+                <p:cNvCxnSpPr>
+                  <a:stCxn id="19" idx="5"/>
+                  <a:endCxn id="20" idx="1"/>
+                </p:cNvCxnSpPr>
+                <p:nvPr/>
+              </p:nvCxnSpPr>
+              <p:spPr>
+                <a:xfrm>
+                  <a:off x="5845968" y="5286297"/>
+                  <a:ext cx="1059371" cy="483392"/>
+                </a:xfrm>
+                <a:prstGeom prst="line">
+                  <a:avLst/>
+                </a:prstGeom>
+                <a:ln w="63500">
+                  <a:solidFill>
+                    <a:srgbClr val="00B0F0"/>
+                  </a:solidFill>
+                  <a:prstDash val="sysDash"/>
+                </a:ln>
+              </p:spPr>
+              <p:style>
+                <a:lnRef idx="1">
+                  <a:schemeClr val="accent1"/>
+                </a:lnRef>
+                <a:fillRef idx="0">
+                  <a:schemeClr val="accent1"/>
+                </a:fillRef>
+                <a:effectRef idx="0">
+                  <a:schemeClr val="accent1"/>
+                </a:effectRef>
+                <a:fontRef idx="minor">
+                  <a:schemeClr val="tx1"/>
+                </a:fontRef>
+              </p:style>
+            </p:cxnSp>
+            <p:cxnSp>
+              <p:nvCxnSpPr>
+                <p:cNvPr id="34" name="直接连接符 33"/>
+                <p:cNvCxnSpPr>
+                  <a:stCxn id="18" idx="5"/>
+                  <a:endCxn id="19" idx="0"/>
+                </p:cNvCxnSpPr>
+                <p:nvPr/>
+              </p:nvCxnSpPr>
+              <p:spPr>
+                <a:xfrm>
+                  <a:off x="5159424" y="3085902"/>
+                  <a:ext cx="616331" cy="2013458"/>
+                </a:xfrm>
+                <a:prstGeom prst="line">
+                  <a:avLst/>
+                </a:prstGeom>
+                <a:ln w="63500">
+                  <a:solidFill>
+                    <a:srgbClr val="00B0F0"/>
+                  </a:solidFill>
+                  <a:prstDash val="sysDash"/>
+                </a:ln>
+              </p:spPr>
+              <p:style>
+                <a:lnRef idx="1">
+                  <a:schemeClr val="accent1"/>
+                </a:lnRef>
+                <a:fillRef idx="0">
+                  <a:schemeClr val="accent1"/>
+                </a:fillRef>
+                <a:effectRef idx="0">
+                  <a:schemeClr val="accent1"/>
+                </a:effectRef>
+                <a:fontRef idx="minor">
+                  <a:schemeClr val="tx1"/>
+                </a:fontRef>
+              </p:style>
+            </p:cxnSp>
+            <p:cxnSp>
+              <p:nvCxnSpPr>
+                <p:cNvPr id="43" name="直接连接符 42"/>
+                <p:cNvCxnSpPr>
+                  <a:stCxn id="20" idx="5"/>
+                  <a:endCxn id="21" idx="2"/>
+                </p:cNvCxnSpPr>
+                <p:nvPr/>
+              </p:nvCxnSpPr>
+              <p:spPr>
+                <a:xfrm>
+                  <a:off x="7045765" y="5924553"/>
+                  <a:ext cx="1384744" cy="68749"/>
+                </a:xfrm>
+                <a:prstGeom prst="line">
+                  <a:avLst/>
+                </a:prstGeom>
+                <a:ln w="63500">
+                  <a:solidFill>
+                    <a:srgbClr val="00B0F0"/>
+                  </a:solidFill>
+                  <a:prstDash val="sysDash"/>
+                </a:ln>
+              </p:spPr>
+              <p:style>
+                <a:lnRef idx="1">
+                  <a:schemeClr val="accent1"/>
+                </a:lnRef>
+                <a:fillRef idx="0">
+                  <a:schemeClr val="accent1"/>
+                </a:fillRef>
+                <a:effectRef idx="0">
+                  <a:schemeClr val="accent1"/>
+                </a:effectRef>
+                <a:fontRef idx="minor">
+                  <a:schemeClr val="tx1"/>
+                </a:fontRef>
+              </p:style>
+            </p:cxnSp>
+          </p:grpSp>
+          <p:sp>
+            <p:nvSpPr>
+              <p:cNvPr id="2" name="TextBox 1"/>
+              <p:cNvSpPr txBox="1"/>
+              <p:nvPr/>
+            </p:nvSpPr>
+            <p:spPr>
+              <a:xfrm>
+                <a:off x="7984968" y="5427875"/>
+                <a:ext cx="962123" cy="369332"/>
+              </a:xfrm>
+              <a:prstGeom prst="rect">
+                <a:avLst/>
+              </a:prstGeom>
+              <a:noFill/>
+            </p:spPr>
+            <p:txBody>
+              <a:bodyPr wrap="none" rtlCol="0">
+                <a:spAutoFit/>
+              </a:bodyPr>
+              <a:lstStyle/>
+              <a:p>
+                <a:r>
+                  <a:rPr lang="en-US" altLang="zh-CN" dirty="0" smtClean="0"/>
+                  <a:t>6 </a:t>
+                </a:r>
+                <a:r>
+                  <a:rPr lang="en-US" altLang="zh-CN" dirty="0" smtClean="0"/>
+                  <a:t>kj/mol</a:t>
+                </a:r>
+                <a:endParaRPr lang="zh-CN" altLang="en-US" dirty="0"/>
+              </a:p>
+            </p:txBody>
+          </p:sp>
           <p:cxnSp>
             <p:nvCxnSpPr>
-              <p:cNvPr id="5" name="直接箭头连接符 4"/>
+              <p:cNvPr id="4" name="直接连接符 3"/>
               <p:cNvCxnSpPr/>
               <p:nvPr/>
             </p:nvCxnSpPr>
             <p:spPr>
               <a:xfrm>
-                <a:off x="489862" y="6077617"/>
-                <a:ext cx="8418264" cy="0"/>
+                <a:off x="3303144" y="1268760"/>
+                <a:ext cx="0" cy="4896544"/>
               </a:xfrm>
-              <a:prstGeom prst="straightConnector1">
+              <a:prstGeom prst="line">
                 <a:avLst/>
               </a:prstGeom>
-              <a:ln w="63500">
-                <a:solidFill>
-                  <a:schemeClr val="tx1"/>
-                </a:solidFill>
-                <a:tailEnd type="triangle"/>
-              </a:ln>
-            </p:spPr>
-            <p:style>
-              <a:lnRef idx="1">
-                <a:schemeClr val="accent1"/>
-              </a:lnRef>
-              <a:fillRef idx="0">
-                <a:schemeClr val="accent1"/>
-              </a:fillRef>
-              <a:effectRef idx="0">
-                <a:schemeClr val="accent1"/>
-              </a:effectRef>
-              <a:fontRef idx="minor">
-                <a:schemeClr val="tx1"/>
-              </a:fontRef>
-            </p:style>
-          </p:cxnSp>
-          <p:cxnSp>
-            <p:nvCxnSpPr>
-              <p:cNvPr id="6" name="直接箭头连接符 5"/>
-              <p:cNvCxnSpPr/>
-              <p:nvPr/>
-            </p:nvCxnSpPr>
-            <p:spPr>
-              <a:xfrm flipV="1">
-                <a:off x="489862" y="1268760"/>
-                <a:ext cx="0" cy="4808857"/>
-              </a:xfrm>
-              <a:prstGeom prst="straightConnector1">
-                <a:avLst/>
-              </a:prstGeom>
-              <a:ln w="63500">
-                <a:solidFill>
-                  <a:schemeClr val="tx1"/>
-                </a:solidFill>
-                <a:tailEnd type="triangle"/>
+              <a:ln w="50800">
+                <a:prstDash val="sysDash"/>
               </a:ln>
             </p:spPr>
             <p:style>
@@ -6653,14 +7449,14 @@
           </p:cxnSp>
           <p:sp>
             <p:nvSpPr>
-              <p:cNvPr id="9" name="TextBox 8"/>
+              <p:cNvPr id="29" name="TextBox 28"/>
               <p:cNvSpPr txBox="1"/>
               <p:nvPr/>
             </p:nvSpPr>
             <p:spPr>
               <a:xfrm>
-                <a:off x="8116038" y="6108975"/>
-                <a:ext cx="827534" cy="369332"/>
+                <a:off x="2892295" y="6180722"/>
+                <a:ext cx="962123" cy="369332"/>
               </a:xfrm>
               <a:prstGeom prst="rect">
                 <a:avLst/>
@@ -6675,736 +7471,22 @@
               <a:p>
                 <a:r>
                   <a:rPr lang="en-US" altLang="zh-CN" dirty="0" smtClean="0"/>
-                  <a:t>energy</a:t>
+                  <a:t>3 kj/mol</a:t>
                 </a:r>
                 <a:endParaRPr lang="zh-CN" altLang="en-US" dirty="0"/>
               </a:p>
             </p:txBody>
           </p:sp>
-          <p:sp>
-            <p:nvSpPr>
-              <p:cNvPr id="10" name="TextBox 9"/>
-              <p:cNvSpPr txBox="1"/>
-              <p:nvPr/>
-            </p:nvSpPr>
-            <p:spPr>
-              <a:xfrm>
-                <a:off x="561870" y="1484784"/>
-                <a:ext cx="969624" cy="369332"/>
-              </a:xfrm>
-              <a:prstGeom prst="rect">
-                <a:avLst/>
-              </a:prstGeom>
-              <a:noFill/>
-            </p:spPr>
-            <p:txBody>
-              <a:bodyPr wrap="none" rtlCol="0">
-                <a:spAutoFit/>
-              </a:bodyPr>
-              <a:lstStyle/>
-              <a:p>
-                <a:r>
-                  <a:rPr lang="en-US" altLang="zh-CN" dirty="0" smtClean="0"/>
-                  <a:t>quantity</a:t>
-                </a:r>
-                <a:endParaRPr lang="zh-CN" altLang="en-US" dirty="0"/>
-              </a:p>
-            </p:txBody>
-          </p:sp>
-          <p:sp>
-            <p:nvSpPr>
-              <p:cNvPr id="13" name="椭圆 12"/>
-              <p:cNvSpPr/>
-              <p:nvPr/>
-            </p:nvSpPr>
-            <p:spPr>
-              <a:xfrm>
-                <a:off x="363278" y="5946294"/>
-                <a:ext cx="198592" cy="219010"/>
-              </a:xfrm>
-              <a:prstGeom prst="ellipse">
-                <a:avLst/>
-              </a:prstGeom>
-            </p:spPr>
-            <p:style>
-              <a:lnRef idx="1">
-                <a:schemeClr val="accent2"/>
-              </a:lnRef>
-              <a:fillRef idx="3">
-                <a:schemeClr val="accent2"/>
-              </a:fillRef>
-              <a:effectRef idx="2">
-                <a:schemeClr val="accent2"/>
-              </a:effectRef>
-              <a:fontRef idx="minor">
-                <a:schemeClr val="lt1"/>
-              </a:fontRef>
-            </p:style>
-            <p:txBody>
-              <a:bodyPr rtlCol="0" anchor="ctr"/>
-              <a:lstStyle/>
-              <a:p>
-                <a:pPr algn="ctr"/>
-                <a:endParaRPr lang="zh-CN" altLang="en-US"/>
-              </a:p>
-            </p:txBody>
-          </p:sp>
-          <p:sp>
-            <p:nvSpPr>
-              <p:cNvPr id="14" name="椭圆 13"/>
-              <p:cNvSpPr/>
-              <p:nvPr/>
-            </p:nvSpPr>
-            <p:spPr>
-              <a:xfrm>
-                <a:off x="2195736" y="5774292"/>
-                <a:ext cx="198592" cy="219010"/>
-              </a:xfrm>
-              <a:prstGeom prst="ellipse">
-                <a:avLst/>
-              </a:prstGeom>
-            </p:spPr>
-            <p:style>
-              <a:lnRef idx="1">
-                <a:schemeClr val="accent2"/>
-              </a:lnRef>
-              <a:fillRef idx="3">
-                <a:schemeClr val="accent2"/>
-              </a:fillRef>
-              <a:effectRef idx="2">
-                <a:schemeClr val="accent2"/>
-              </a:effectRef>
-              <a:fontRef idx="minor">
-                <a:schemeClr val="lt1"/>
-              </a:fontRef>
-            </p:style>
-            <p:txBody>
-              <a:bodyPr rtlCol="0" anchor="ctr"/>
-              <a:lstStyle/>
-              <a:p>
-                <a:pPr algn="ctr"/>
-                <a:endParaRPr lang="zh-CN" altLang="en-US"/>
-              </a:p>
-            </p:txBody>
-          </p:sp>
-          <p:sp>
-            <p:nvSpPr>
-              <p:cNvPr id="15" name="椭圆 14"/>
-              <p:cNvSpPr/>
-              <p:nvPr/>
-            </p:nvSpPr>
-            <p:spPr>
-              <a:xfrm>
-                <a:off x="3203848" y="5208865"/>
-                <a:ext cx="198592" cy="219010"/>
-              </a:xfrm>
-              <a:prstGeom prst="ellipse">
-                <a:avLst/>
-              </a:prstGeom>
-            </p:spPr>
-            <p:style>
-              <a:lnRef idx="1">
-                <a:schemeClr val="accent2"/>
-              </a:lnRef>
-              <a:fillRef idx="3">
-                <a:schemeClr val="accent2"/>
-              </a:fillRef>
-              <a:effectRef idx="2">
-                <a:schemeClr val="accent2"/>
-              </a:effectRef>
-              <a:fontRef idx="minor">
-                <a:schemeClr val="lt1"/>
-              </a:fontRef>
-            </p:style>
-            <p:txBody>
-              <a:bodyPr rtlCol="0" anchor="ctr"/>
-              <a:lstStyle/>
-              <a:p>
-                <a:pPr algn="ctr"/>
-                <a:endParaRPr lang="zh-CN" altLang="en-US"/>
-              </a:p>
-            </p:txBody>
-          </p:sp>
-          <p:sp>
-            <p:nvSpPr>
-              <p:cNvPr id="16" name="椭圆 15"/>
-              <p:cNvSpPr/>
-              <p:nvPr/>
-            </p:nvSpPr>
-            <p:spPr>
-              <a:xfrm>
-                <a:off x="3851920" y="2924944"/>
-                <a:ext cx="198592" cy="219010"/>
-              </a:xfrm>
-              <a:prstGeom prst="ellipse">
-                <a:avLst/>
-              </a:prstGeom>
-            </p:spPr>
-            <p:style>
-              <a:lnRef idx="1">
-                <a:schemeClr val="accent2"/>
-              </a:lnRef>
-              <a:fillRef idx="3">
-                <a:schemeClr val="accent2"/>
-              </a:fillRef>
-              <a:effectRef idx="2">
-                <a:schemeClr val="accent2"/>
-              </a:effectRef>
-              <a:fontRef idx="minor">
-                <a:schemeClr val="lt1"/>
-              </a:fontRef>
-            </p:style>
-            <p:txBody>
-              <a:bodyPr rtlCol="0" anchor="ctr"/>
-              <a:lstStyle/>
-              <a:p>
-                <a:pPr algn="ctr"/>
-                <a:endParaRPr lang="zh-CN" altLang="en-US"/>
-              </a:p>
-            </p:txBody>
-          </p:sp>
-          <p:sp>
-            <p:nvSpPr>
-              <p:cNvPr id="17" name="椭圆 16"/>
-              <p:cNvSpPr/>
-              <p:nvPr/>
-            </p:nvSpPr>
-            <p:spPr>
-              <a:xfrm>
-                <a:off x="4411756" y="2420888"/>
-                <a:ext cx="198592" cy="219010"/>
-              </a:xfrm>
-              <a:prstGeom prst="ellipse">
-                <a:avLst/>
-              </a:prstGeom>
-            </p:spPr>
-            <p:style>
-              <a:lnRef idx="1">
-                <a:schemeClr val="accent2"/>
-              </a:lnRef>
-              <a:fillRef idx="3">
-                <a:schemeClr val="accent2"/>
-              </a:fillRef>
-              <a:effectRef idx="2">
-                <a:schemeClr val="accent2"/>
-              </a:effectRef>
-              <a:fontRef idx="minor">
-                <a:schemeClr val="lt1"/>
-              </a:fontRef>
-            </p:style>
-            <p:txBody>
-              <a:bodyPr rtlCol="0" anchor="ctr"/>
-              <a:lstStyle/>
-              <a:p>
-                <a:pPr algn="ctr"/>
-                <a:endParaRPr lang="zh-CN" altLang="en-US"/>
-              </a:p>
-            </p:txBody>
-          </p:sp>
-          <p:sp>
-            <p:nvSpPr>
-              <p:cNvPr id="18" name="椭圆 17"/>
-              <p:cNvSpPr/>
-              <p:nvPr/>
-            </p:nvSpPr>
-            <p:spPr>
-              <a:xfrm>
-                <a:off x="4989915" y="2898965"/>
-                <a:ext cx="198592" cy="219010"/>
-              </a:xfrm>
-              <a:prstGeom prst="ellipse">
-                <a:avLst/>
-              </a:prstGeom>
-            </p:spPr>
-            <p:style>
-              <a:lnRef idx="1">
-                <a:schemeClr val="accent2"/>
-              </a:lnRef>
-              <a:fillRef idx="3">
-                <a:schemeClr val="accent2"/>
-              </a:fillRef>
-              <a:effectRef idx="2">
-                <a:schemeClr val="accent2"/>
-              </a:effectRef>
-              <a:fontRef idx="minor">
-                <a:schemeClr val="lt1"/>
-              </a:fontRef>
-            </p:style>
-            <p:txBody>
-              <a:bodyPr rtlCol="0" anchor="ctr"/>
-              <a:lstStyle/>
-              <a:p>
-                <a:pPr algn="ctr"/>
-                <a:endParaRPr lang="zh-CN" altLang="en-US"/>
-              </a:p>
-            </p:txBody>
-          </p:sp>
-          <p:sp>
-            <p:nvSpPr>
-              <p:cNvPr id="19" name="椭圆 18"/>
-              <p:cNvSpPr/>
-              <p:nvPr/>
-            </p:nvSpPr>
-            <p:spPr>
-              <a:xfrm>
-                <a:off x="5676459" y="5099360"/>
-                <a:ext cx="198592" cy="219010"/>
-              </a:xfrm>
-              <a:prstGeom prst="ellipse">
-                <a:avLst/>
-              </a:prstGeom>
-            </p:spPr>
-            <p:style>
-              <a:lnRef idx="1">
-                <a:schemeClr val="accent2"/>
-              </a:lnRef>
-              <a:fillRef idx="3">
-                <a:schemeClr val="accent2"/>
-              </a:fillRef>
-              <a:effectRef idx="2">
-                <a:schemeClr val="accent2"/>
-              </a:effectRef>
-              <a:fontRef idx="minor">
-                <a:schemeClr val="lt1"/>
-              </a:fontRef>
-            </p:style>
-            <p:txBody>
-              <a:bodyPr rtlCol="0" anchor="ctr"/>
-              <a:lstStyle/>
-              <a:p>
-                <a:pPr algn="ctr"/>
-                <a:endParaRPr lang="zh-CN" altLang="en-US"/>
-              </a:p>
-            </p:txBody>
-          </p:sp>
-          <p:sp>
-            <p:nvSpPr>
-              <p:cNvPr id="20" name="椭圆 19"/>
-              <p:cNvSpPr/>
-              <p:nvPr/>
-            </p:nvSpPr>
-            <p:spPr>
-              <a:xfrm>
-                <a:off x="6876256" y="5737616"/>
-                <a:ext cx="198592" cy="219010"/>
-              </a:xfrm>
-              <a:prstGeom prst="ellipse">
-                <a:avLst/>
-              </a:prstGeom>
-            </p:spPr>
-            <p:style>
-              <a:lnRef idx="1">
-                <a:schemeClr val="accent2"/>
-              </a:lnRef>
-              <a:fillRef idx="3">
-                <a:schemeClr val="accent2"/>
-              </a:fillRef>
-              <a:effectRef idx="2">
-                <a:schemeClr val="accent2"/>
-              </a:effectRef>
-              <a:fontRef idx="minor">
-                <a:schemeClr val="lt1"/>
-              </a:fontRef>
-            </p:style>
-            <p:txBody>
-              <a:bodyPr rtlCol="0" anchor="ctr"/>
-              <a:lstStyle/>
-              <a:p>
-                <a:pPr algn="ctr"/>
-                <a:endParaRPr lang="zh-CN" altLang="en-US"/>
-              </a:p>
-            </p:txBody>
-          </p:sp>
-          <p:sp>
-            <p:nvSpPr>
-              <p:cNvPr id="21" name="椭圆 20"/>
-              <p:cNvSpPr/>
-              <p:nvPr/>
-            </p:nvSpPr>
-            <p:spPr>
-              <a:xfrm>
-                <a:off x="8430509" y="5883797"/>
-                <a:ext cx="198592" cy="219010"/>
-              </a:xfrm>
-              <a:prstGeom prst="ellipse">
-                <a:avLst/>
-              </a:prstGeom>
-            </p:spPr>
-            <p:style>
-              <a:lnRef idx="1">
-                <a:schemeClr val="accent2"/>
-              </a:lnRef>
-              <a:fillRef idx="3">
-                <a:schemeClr val="accent2"/>
-              </a:fillRef>
-              <a:effectRef idx="2">
-                <a:schemeClr val="accent2"/>
-              </a:effectRef>
-              <a:fontRef idx="minor">
-                <a:schemeClr val="lt1"/>
-              </a:fontRef>
-            </p:style>
-            <p:txBody>
-              <a:bodyPr rtlCol="0" anchor="ctr"/>
-              <a:lstStyle/>
-              <a:p>
-                <a:pPr algn="ctr"/>
-                <a:endParaRPr lang="zh-CN" altLang="en-US"/>
-              </a:p>
-            </p:txBody>
-          </p:sp>
-          <p:cxnSp>
-            <p:nvCxnSpPr>
-              <p:cNvPr id="23" name="直接连接符 22"/>
-              <p:cNvCxnSpPr>
-                <a:stCxn id="13" idx="6"/>
-                <a:endCxn id="14" idx="2"/>
-              </p:cNvCxnSpPr>
-              <p:nvPr/>
-            </p:nvCxnSpPr>
-            <p:spPr>
-              <a:xfrm flipV="1">
-                <a:off x="561870" y="5883797"/>
-                <a:ext cx="1633866" cy="172002"/>
-              </a:xfrm>
-              <a:prstGeom prst="line">
-                <a:avLst/>
-              </a:prstGeom>
-              <a:ln w="63500">
-                <a:solidFill>
-                  <a:srgbClr val="00B0F0"/>
-                </a:solidFill>
-                <a:prstDash val="sysDash"/>
-              </a:ln>
-            </p:spPr>
-            <p:style>
-              <a:lnRef idx="1">
-                <a:schemeClr val="accent1"/>
-              </a:lnRef>
-              <a:fillRef idx="0">
-                <a:schemeClr val="accent1"/>
-              </a:fillRef>
-              <a:effectRef idx="0">
-                <a:schemeClr val="accent1"/>
-              </a:effectRef>
-              <a:fontRef idx="minor">
-                <a:schemeClr val="tx1"/>
-              </a:fontRef>
-            </p:style>
-          </p:cxnSp>
-          <p:cxnSp>
-            <p:nvCxnSpPr>
-              <p:cNvPr id="25" name="直接连接符 24"/>
-              <p:cNvCxnSpPr>
-                <a:stCxn id="14" idx="6"/>
-                <a:endCxn id="15" idx="3"/>
-              </p:cNvCxnSpPr>
-              <p:nvPr/>
-            </p:nvCxnSpPr>
-            <p:spPr>
-              <a:xfrm flipV="1">
-                <a:off x="2394328" y="5395802"/>
-                <a:ext cx="838603" cy="487995"/>
-              </a:xfrm>
-              <a:prstGeom prst="line">
-                <a:avLst/>
-              </a:prstGeom>
-              <a:ln w="63500">
-                <a:solidFill>
-                  <a:srgbClr val="00B0F0"/>
-                </a:solidFill>
-                <a:prstDash val="sysDash"/>
-              </a:ln>
-            </p:spPr>
-            <p:style>
-              <a:lnRef idx="1">
-                <a:schemeClr val="accent1"/>
-              </a:lnRef>
-              <a:fillRef idx="0">
-                <a:schemeClr val="accent1"/>
-              </a:fillRef>
-              <a:effectRef idx="0">
-                <a:schemeClr val="accent1"/>
-              </a:effectRef>
-              <a:fontRef idx="minor">
-                <a:schemeClr val="tx1"/>
-              </a:fontRef>
-            </p:style>
-          </p:cxnSp>
-          <p:cxnSp>
-            <p:nvCxnSpPr>
-              <p:cNvPr id="28" name="直接连接符 27"/>
-              <p:cNvCxnSpPr>
-                <a:stCxn id="15" idx="7"/>
-                <a:endCxn id="16" idx="4"/>
-              </p:cNvCxnSpPr>
-              <p:nvPr/>
-            </p:nvCxnSpPr>
-            <p:spPr>
-              <a:xfrm flipV="1">
-                <a:off x="3373357" y="3143954"/>
-                <a:ext cx="577859" cy="2096984"/>
-              </a:xfrm>
-              <a:prstGeom prst="line">
-                <a:avLst/>
-              </a:prstGeom>
-              <a:ln w="63500">
-                <a:solidFill>
-                  <a:srgbClr val="00B0F0"/>
-                </a:solidFill>
-                <a:prstDash val="sysDash"/>
-              </a:ln>
-            </p:spPr>
-            <p:style>
-              <a:lnRef idx="1">
-                <a:schemeClr val="accent1"/>
-              </a:lnRef>
-              <a:fillRef idx="0">
-                <a:schemeClr val="accent1"/>
-              </a:fillRef>
-              <a:effectRef idx="0">
-                <a:schemeClr val="accent1"/>
-              </a:effectRef>
-              <a:fontRef idx="minor">
-                <a:schemeClr val="tx1"/>
-              </a:fontRef>
-            </p:style>
-          </p:cxnSp>
-          <p:cxnSp>
-            <p:nvCxnSpPr>
-              <p:cNvPr id="31" name="直接连接符 30"/>
-              <p:cNvCxnSpPr>
-                <a:stCxn id="16" idx="7"/>
-                <a:endCxn id="17" idx="3"/>
-              </p:cNvCxnSpPr>
-              <p:nvPr/>
-            </p:nvCxnSpPr>
-            <p:spPr>
-              <a:xfrm flipV="1">
-                <a:off x="4021429" y="2607825"/>
-                <a:ext cx="419410" cy="349192"/>
-              </a:xfrm>
-              <a:prstGeom prst="line">
-                <a:avLst/>
-              </a:prstGeom>
-              <a:ln w="63500">
-                <a:solidFill>
-                  <a:srgbClr val="00B0F0"/>
-                </a:solidFill>
-                <a:prstDash val="sysDash"/>
-              </a:ln>
-            </p:spPr>
-            <p:style>
-              <a:lnRef idx="1">
-                <a:schemeClr val="accent1"/>
-              </a:lnRef>
-              <a:fillRef idx="0">
-                <a:schemeClr val="accent1"/>
-              </a:fillRef>
-              <a:effectRef idx="0">
-                <a:schemeClr val="accent1"/>
-              </a:effectRef>
-              <a:fontRef idx="minor">
-                <a:schemeClr val="tx1"/>
-              </a:fontRef>
-            </p:style>
-          </p:cxnSp>
-          <p:cxnSp>
-            <p:nvCxnSpPr>
-              <p:cNvPr id="32" name="直接连接符 31"/>
-              <p:cNvCxnSpPr>
-                <a:stCxn id="17" idx="5"/>
-                <a:endCxn id="18" idx="2"/>
-              </p:cNvCxnSpPr>
-              <p:nvPr/>
-            </p:nvCxnSpPr>
-            <p:spPr>
-              <a:xfrm>
-                <a:off x="4581265" y="2607825"/>
-                <a:ext cx="408650" cy="400645"/>
-              </a:xfrm>
-              <a:prstGeom prst="line">
-                <a:avLst/>
-              </a:prstGeom>
-              <a:ln w="63500">
-                <a:solidFill>
-                  <a:srgbClr val="00B0F0"/>
-                </a:solidFill>
-                <a:prstDash val="sysDash"/>
-              </a:ln>
-            </p:spPr>
-            <p:style>
-              <a:lnRef idx="1">
-                <a:schemeClr val="accent1"/>
-              </a:lnRef>
-              <a:fillRef idx="0">
-                <a:schemeClr val="accent1"/>
-              </a:fillRef>
-              <a:effectRef idx="0">
-                <a:schemeClr val="accent1"/>
-              </a:effectRef>
-              <a:fontRef idx="minor">
-                <a:schemeClr val="tx1"/>
-              </a:fontRef>
-            </p:style>
-          </p:cxnSp>
-          <p:cxnSp>
-            <p:nvCxnSpPr>
-              <p:cNvPr id="33" name="直接连接符 32"/>
-              <p:cNvCxnSpPr>
-                <a:stCxn id="19" idx="5"/>
-                <a:endCxn id="20" idx="1"/>
-              </p:cNvCxnSpPr>
-              <p:nvPr/>
-            </p:nvCxnSpPr>
-            <p:spPr>
-              <a:xfrm>
-                <a:off x="5845968" y="5286297"/>
-                <a:ext cx="1059371" cy="483392"/>
-              </a:xfrm>
-              <a:prstGeom prst="line">
-                <a:avLst/>
-              </a:prstGeom>
-              <a:ln w="63500">
-                <a:solidFill>
-                  <a:srgbClr val="00B0F0"/>
-                </a:solidFill>
-                <a:prstDash val="sysDash"/>
-              </a:ln>
-            </p:spPr>
-            <p:style>
-              <a:lnRef idx="1">
-                <a:schemeClr val="accent1"/>
-              </a:lnRef>
-              <a:fillRef idx="0">
-                <a:schemeClr val="accent1"/>
-              </a:fillRef>
-              <a:effectRef idx="0">
-                <a:schemeClr val="accent1"/>
-              </a:effectRef>
-              <a:fontRef idx="minor">
-                <a:schemeClr val="tx1"/>
-              </a:fontRef>
-            </p:style>
-          </p:cxnSp>
-          <p:cxnSp>
-            <p:nvCxnSpPr>
-              <p:cNvPr id="34" name="直接连接符 33"/>
-              <p:cNvCxnSpPr>
-                <a:stCxn id="18" idx="5"/>
-                <a:endCxn id="19" idx="0"/>
-              </p:cNvCxnSpPr>
-              <p:nvPr/>
-            </p:nvCxnSpPr>
-            <p:spPr>
-              <a:xfrm>
-                <a:off x="5159424" y="3085902"/>
-                <a:ext cx="616331" cy="2013458"/>
-              </a:xfrm>
-              <a:prstGeom prst="line">
-                <a:avLst/>
-              </a:prstGeom>
-              <a:ln w="63500">
-                <a:solidFill>
-                  <a:srgbClr val="00B0F0"/>
-                </a:solidFill>
-                <a:prstDash val="sysDash"/>
-              </a:ln>
-            </p:spPr>
-            <p:style>
-              <a:lnRef idx="1">
-                <a:schemeClr val="accent1"/>
-              </a:lnRef>
-              <a:fillRef idx="0">
-                <a:schemeClr val="accent1"/>
-              </a:fillRef>
-              <a:effectRef idx="0">
-                <a:schemeClr val="accent1"/>
-              </a:effectRef>
-              <a:fontRef idx="minor">
-                <a:schemeClr val="tx1"/>
-              </a:fontRef>
-            </p:style>
-          </p:cxnSp>
-          <p:cxnSp>
-            <p:nvCxnSpPr>
-              <p:cNvPr id="43" name="直接连接符 42"/>
-              <p:cNvCxnSpPr>
-                <a:stCxn id="20" idx="5"/>
-                <a:endCxn id="21" idx="2"/>
-              </p:cNvCxnSpPr>
-              <p:nvPr/>
-            </p:nvCxnSpPr>
-            <p:spPr>
-              <a:xfrm>
-                <a:off x="7045765" y="5924553"/>
-                <a:ext cx="1384744" cy="68749"/>
-              </a:xfrm>
-              <a:prstGeom prst="line">
-                <a:avLst/>
-              </a:prstGeom>
-              <a:ln w="63500">
-                <a:solidFill>
-                  <a:srgbClr val="00B0F0"/>
-                </a:solidFill>
-                <a:prstDash val="sysDash"/>
-              </a:ln>
-            </p:spPr>
-            <p:style>
-              <a:lnRef idx="1">
-                <a:schemeClr val="accent1"/>
-              </a:lnRef>
-              <a:fillRef idx="0">
-                <a:schemeClr val="accent1"/>
-              </a:fillRef>
-              <a:effectRef idx="0">
-                <a:schemeClr val="accent1"/>
-              </a:effectRef>
-              <a:fontRef idx="minor">
-                <a:schemeClr val="tx1"/>
-              </a:fontRef>
-            </p:style>
-          </p:cxnSp>
         </p:grpSp>
-        <p:sp>
-          <p:nvSpPr>
-            <p:cNvPr id="2" name="TextBox 1"/>
-            <p:cNvSpPr txBox="1"/>
-            <p:nvPr/>
-          </p:nvSpPr>
-          <p:spPr>
-            <a:xfrm>
-              <a:off x="8048743" y="6478307"/>
-              <a:ext cx="962123" cy="369332"/>
-            </a:xfrm>
-            <a:prstGeom prst="rect">
-              <a:avLst/>
-            </a:prstGeom>
-            <a:noFill/>
-          </p:spPr>
-          <p:txBody>
-            <a:bodyPr wrap="none" rtlCol="0">
-              <a:spAutoFit/>
-            </a:bodyPr>
-            <a:lstStyle/>
-            <a:p>
-              <a:r>
-                <a:rPr lang="en-US" altLang="zh-CN" dirty="0" smtClean="0"/>
-                <a:t>4 kj/mol</a:t>
-              </a:r>
-              <a:endParaRPr lang="zh-CN" altLang="en-US" dirty="0"/>
-            </a:p>
-          </p:txBody>
-        </p:sp>
         <p:cxnSp>
           <p:nvCxnSpPr>
-            <p:cNvPr id="4" name="直接连接符 3"/>
+            <p:cNvPr id="30" name="直接连接符 29"/>
             <p:cNvCxnSpPr/>
             <p:nvPr/>
           </p:nvCxnSpPr>
           <p:spPr>
             <a:xfrm>
-              <a:off x="3303144" y="1268760"/>
+              <a:off x="6848240" y="774243"/>
               <a:ext cx="0" cy="4896544"/>
             </a:xfrm>
             <a:prstGeom prst="line">
@@ -7431,13 +7513,13 @@
         </p:cxnSp>
         <p:sp>
           <p:nvSpPr>
-            <p:cNvPr id="29" name="TextBox 28"/>
+            <p:cNvPr id="35" name="TextBox 34"/>
             <p:cNvSpPr txBox="1"/>
             <p:nvPr/>
           </p:nvSpPr>
           <p:spPr>
             <a:xfrm>
-              <a:off x="2892295" y="6180722"/>
+              <a:off x="6431502" y="5798649"/>
               <a:ext cx="962123" cy="369332"/>
             </a:xfrm>
             <a:prstGeom prst="rect">
@@ -7453,7 +7535,11 @@
             <a:p>
               <a:r>
                 <a:rPr lang="en-US" altLang="zh-CN" dirty="0" smtClean="0"/>
-                <a:t>3 kj/mol</a:t>
+                <a:t>5 </a:t>
+              </a:r>
+              <a:r>
+                <a:rPr lang="en-US" altLang="zh-CN" dirty="0" smtClean="0"/>
+                <a:t>kj/mol</a:t>
               </a:r>
               <a:endParaRPr lang="zh-CN" altLang="en-US" dirty="0"/>
             </a:p>

</xml_diff>